<commit_message>
update final version of report slide
</commit_message>
<xml_diff>
--- a/Document/03.Requirement/FUFO_Scope_pptx.pptx
+++ b/Document/03.Requirement/FUFO_Scope_pptx.pptx
@@ -5,7 +5,7 @@
     <p:sldMasterId id="2147483648" r:id="rId1"/>
   </p:sldMasterIdLst>
   <p:notesMasterIdLst>
-    <p:notesMasterId r:id="rId31"/>
+    <p:notesMasterId r:id="rId32"/>
   </p:notesMasterIdLst>
   <p:sldIdLst>
     <p:sldId id="256" r:id="rId2"/>
@@ -21,22 +21,23 @@
     <p:sldId id="302" r:id="rId12"/>
     <p:sldId id="298" r:id="rId13"/>
     <p:sldId id="312" r:id="rId14"/>
-    <p:sldId id="306" r:id="rId15"/>
-    <p:sldId id="309" r:id="rId16"/>
-    <p:sldId id="289" r:id="rId17"/>
-    <p:sldId id="282" r:id="rId18"/>
-    <p:sldId id="307" r:id="rId19"/>
-    <p:sldId id="308" r:id="rId20"/>
-    <p:sldId id="290" r:id="rId21"/>
-    <p:sldId id="299" r:id="rId22"/>
-    <p:sldId id="300" r:id="rId23"/>
-    <p:sldId id="301" r:id="rId24"/>
-    <p:sldId id="310" r:id="rId25"/>
-    <p:sldId id="288" r:id="rId26"/>
-    <p:sldId id="303" r:id="rId27"/>
-    <p:sldId id="304" r:id="rId28"/>
-    <p:sldId id="305" r:id="rId29"/>
-    <p:sldId id="275" r:id="rId30"/>
+    <p:sldId id="313" r:id="rId15"/>
+    <p:sldId id="306" r:id="rId16"/>
+    <p:sldId id="309" r:id="rId17"/>
+    <p:sldId id="289" r:id="rId18"/>
+    <p:sldId id="282" r:id="rId19"/>
+    <p:sldId id="307" r:id="rId20"/>
+    <p:sldId id="308" r:id="rId21"/>
+    <p:sldId id="290" r:id="rId22"/>
+    <p:sldId id="299" r:id="rId23"/>
+    <p:sldId id="300" r:id="rId24"/>
+    <p:sldId id="301" r:id="rId25"/>
+    <p:sldId id="310" r:id="rId26"/>
+    <p:sldId id="288" r:id="rId27"/>
+    <p:sldId id="303" r:id="rId28"/>
+    <p:sldId id="304" r:id="rId29"/>
+    <p:sldId id="305" r:id="rId30"/>
+    <p:sldId id="275" r:id="rId31"/>
   </p:sldIdLst>
   <p:sldSz cx="9144000" cy="6858000" type="screen4x3"/>
   <p:notesSz cx="6858000" cy="9144000"/>
@@ -2896,7 +2897,7 @@
               <a:pPr>
                 <a:defRPr/>
               </a:pPr>
-              <a:t>5/9/2012</a:t>
+              <a:t>5/16/2012</a:t>
             </a:fld>
             <a:endParaRPr lang="en-US" dirty="0"/>
           </a:p>
@@ -8481,13 +8482,7 @@
               <a:rPr lang="en-US" sz="2800" kern="0" dirty="0" smtClean="0">
                 <a:latin typeface="+mn-lt"/>
               </a:rPr>
-              <a:t> </a:t>
-            </a:r>
-            <a:r>
-              <a:rPr lang="en-US" sz="2800" kern="0" dirty="0" smtClean="0">
-                <a:latin typeface="+mn-lt"/>
-              </a:rPr>
-              <a:t>Quadrocopter is more suitable for Computer Engineering students who are not familiar with aerodynamic issue and mechanical design.</a:t>
+              <a:t> Quadrocopter is more suitable for Computer Engineering students who are not familiar with aerodynamic issue and mechanical design.</a:t>
             </a:r>
             <a:endParaRPr kumimoji="0" lang="en-US" sz="2400" b="0" i="0" u="none" strike="noStrike" kern="0" cap="none" spc="0" normalizeH="0" baseline="0" noProof="0" dirty="0" smtClean="0">
               <a:ln>
@@ -10375,92 +10370,29 @@
       </p:grpSpPr>
       <p:sp>
         <p:nvSpPr>
-          <p:cNvPr id="3" name="Content Placeholder 2"/>
+          <p:cNvPr id="2" name="Title 1"/>
           <p:cNvSpPr>
             <a:spLocks noGrp="1"/>
           </p:cNvSpPr>
           <p:nvPr>
-            <p:ph idx="1"/>
+            <p:ph type="title"/>
           </p:nvPr>
         </p:nvSpPr>
-        <p:spPr/>
+        <p:spPr>
+          <a:xfrm>
+            <a:off x="2971800" y="319088"/>
+            <a:ext cx="4876800" cy="563562"/>
+          </a:xfrm>
+        </p:spPr>
         <p:txBody>
           <a:bodyPr/>
           <a:lstStyle/>
           <a:p>
-            <a:r>
-              <a:rPr lang="en-US" b="1" dirty="0" smtClean="0"/>
-              <a:t>Quadrocopter:</a:t>
-            </a:r>
-          </a:p>
-          <a:p>
-            <a:pPr lvl="1"/>
+            <a:pPr algn="l"/>
             <a:r>
               <a:rPr lang="en-US" dirty="0" smtClean="0"/>
-              <a:t>Max speed &lt; 60 km/h under “good condition”(*)</a:t>
+              <a:t>System overview</a:t>
             </a:r>
-          </a:p>
-          <a:p>
-            <a:pPr lvl="1"/>
-            <a:r>
-              <a:rPr lang="en-US" dirty="0" smtClean="0"/>
-              <a:t>Can hover and keep stable in “light wind” (**)</a:t>
-            </a:r>
-          </a:p>
-          <a:p>
-            <a:pPr lvl="1"/>
-            <a:r>
-              <a:rPr lang="en-US" dirty="0" smtClean="0"/>
-              <a:t>Under good condition can capture stable video stream.</a:t>
-            </a:r>
-          </a:p>
-          <a:p>
-            <a:pPr lvl="1"/>
-            <a:r>
-              <a:rPr lang="en-US" dirty="0" smtClean="0"/>
-              <a:t>Can carry &gt;500 grams and hover &gt;30m high.</a:t>
-            </a:r>
-          </a:p>
-          <a:p>
-            <a:pPr lvl="1"/>
-            <a:r>
-              <a:rPr lang="en-US" dirty="0" smtClean="0"/>
-              <a:t>Batteries last ~15 minutes without carrying anything</a:t>
-            </a:r>
-          </a:p>
-          <a:p>
-            <a:pPr lvl="1" eaLnBrk="1" hangingPunct="1"/>
-            <a:endParaRPr lang="en-US" dirty="0" smtClean="0"/>
-          </a:p>
-          <a:p>
-            <a:pPr lvl="1" eaLnBrk="1" hangingPunct="1"/>
-            <a:r>
-              <a:rPr lang="en-US" sz="1200" dirty="0" smtClean="0"/>
-              <a:t>(*</a:t>
-            </a:r>
-            <a:r>
-              <a:rPr lang="en-US" sz="1200" dirty="0" smtClean="0">
-                <a:sym typeface="Wingdings" pitchFamily="2" charset="2"/>
-              </a:rPr>
-              <a:t>)</a:t>
-            </a:r>
-            <a:r>
-              <a:rPr lang="en-US" sz="1200" dirty="0" smtClean="0"/>
-              <a:t> good condition is a condition where wind speed ~ 0m/s, temperature 10 - 30 Celsius,  acceptable humidity.</a:t>
-            </a:r>
-          </a:p>
-          <a:p>
-            <a:pPr lvl="1" eaLnBrk="1" hangingPunct="1"/>
-            <a:r>
-              <a:rPr lang="en-US" sz="1200" dirty="0" smtClean="0"/>
-              <a:t>(**) what is “light wind” will be investigated during the project time.  </a:t>
-            </a:r>
-          </a:p>
-          <a:p>
-            <a:pPr lvl="1"/>
-            <a:endParaRPr lang="en-US" dirty="0" smtClean="0"/>
-          </a:p>
-          <a:p>
             <a:endParaRPr lang="en-US" dirty="0"/>
           </a:p>
         </p:txBody>
@@ -10494,38 +10426,33 @@
           </a:p>
         </p:txBody>
       </p:sp>
+      <p:pic>
+        <p:nvPicPr>
+          <p:cNvPr id="8" name="Picture 7" descr="logo_final.png"/>
+          <p:cNvPicPr>
+            <a:picLocks noChangeAspect="1"/>
+          </p:cNvPicPr>
+          <p:nvPr/>
+        </p:nvPicPr>
+        <p:blipFill>
+          <a:blip r:embed="rId2" cstate="print"/>
+          <a:stretch>
+            <a:fillRect/>
+          </a:stretch>
+        </p:blipFill>
+        <p:spPr>
+          <a:xfrm>
+            <a:off x="8001000" y="0"/>
+            <a:ext cx="1219200" cy="1219200"/>
+          </a:xfrm>
+          <a:prstGeom prst="rect">
+            <a:avLst/>
+          </a:prstGeom>
+        </p:spPr>
+      </p:pic>
       <p:sp>
         <p:nvSpPr>
-          <p:cNvPr id="10" name="Title 1"/>
-          <p:cNvSpPr>
-            <a:spLocks noGrp="1"/>
-          </p:cNvSpPr>
-          <p:nvPr>
-            <p:ph type="title"/>
-          </p:nvPr>
-        </p:nvSpPr>
-        <p:spPr>
-          <a:xfrm>
-            <a:off x="2971800" y="319088"/>
-            <a:ext cx="4876800" cy="563562"/>
-          </a:xfrm>
-        </p:spPr>
-        <p:txBody>
-          <a:bodyPr/>
-          <a:lstStyle/>
-          <a:p>
-            <a:pPr algn="l"/>
-            <a:r>
-              <a:rPr lang="en-US" dirty="0" smtClean="0"/>
-              <a:t>Quadrocopter</a:t>
-            </a:r>
-            <a:endParaRPr lang="en-US" dirty="0"/>
-          </a:p>
-        </p:txBody>
-      </p:sp>
-      <p:sp>
-        <p:nvSpPr>
-          <p:cNvPr id="11" name="Rounded Rectangle 10"/>
+          <p:cNvPr id="15" name="Rounded Rectangle 14"/>
           <p:cNvSpPr/>
           <p:nvPr/>
         </p:nvSpPr>
@@ -10570,26 +10497,66 @@
       </p:sp>
       <p:pic>
         <p:nvPicPr>
-          <p:cNvPr id="6" name="Picture 5" descr="logo_final.png"/>
+          <p:cNvPr id="1026" name="Picture 4"/>
           <p:cNvPicPr>
-            <a:picLocks noChangeAspect="1"/>
+            <a:picLocks noChangeAspect="1" noChangeArrowheads="1"/>
           </p:cNvPicPr>
           <p:nvPr/>
         </p:nvPicPr>
         <p:blipFill>
-          <a:blip r:embed="rId2" cstate="print"/>
+          <a:blip r:embed="rId3"/>
+          <a:srcRect/>
           <a:stretch>
             <a:fillRect/>
           </a:stretch>
         </p:blipFill>
-        <p:spPr>
+        <p:spPr bwMode="auto">
           <a:xfrm>
-            <a:off x="8001000" y="0"/>
-            <a:ext cx="1219200" cy="1219200"/>
+            <a:off x="549024" y="1752600"/>
+            <a:ext cx="8594976" cy="3581400"/>
           </a:xfrm>
           <a:prstGeom prst="rect">
             <a:avLst/>
           </a:prstGeom>
+          <a:noFill/>
+          <a:ln w="9525">
+            <a:noFill/>
+            <a:miter lim="800000"/>
+            <a:headEnd/>
+            <a:tailEnd/>
+          </a:ln>
+        </p:spPr>
+      </p:pic>
+      <p:pic>
+        <p:nvPicPr>
+          <p:cNvPr id="1027" name="Picture 5"/>
+          <p:cNvPicPr>
+            <a:picLocks noChangeAspect="1" noChangeArrowheads="1"/>
+          </p:cNvPicPr>
+          <p:nvPr/>
+        </p:nvPicPr>
+        <p:blipFill>
+          <a:blip r:embed="rId4"/>
+          <a:srcRect/>
+          <a:stretch>
+            <a:fillRect/>
+          </a:stretch>
+        </p:blipFill>
+        <p:spPr bwMode="auto">
+          <a:xfrm>
+            <a:off x="762000" y="3962400"/>
+            <a:ext cx="4166016" cy="2647950"/>
+          </a:xfrm>
+          <a:prstGeom prst="rect">
+            <a:avLst/>
+          </a:prstGeom>
+          <a:noFill/>
+          <a:ln w="9525">
+            <a:noFill/>
+            <a:miter lim="800000"/>
+            <a:headEnd/>
+            <a:tailEnd/>
+          </a:ln>
         </p:spPr>
       </p:pic>
     </p:spTree>
@@ -10639,6 +10606,79 @@
           <a:bodyPr/>
           <a:lstStyle/>
           <a:p>
+            <a:r>
+              <a:rPr lang="en-US" b="1" dirty="0" smtClean="0"/>
+              <a:t>Quadrocopter:</a:t>
+            </a:r>
+          </a:p>
+          <a:p>
+            <a:pPr lvl="1"/>
+            <a:r>
+              <a:rPr lang="en-US" dirty="0" smtClean="0"/>
+              <a:t>Max speed &lt; 60 km/h under “good condition”(*)</a:t>
+            </a:r>
+          </a:p>
+          <a:p>
+            <a:pPr lvl="1"/>
+            <a:r>
+              <a:rPr lang="en-US" dirty="0" smtClean="0"/>
+              <a:t>Can hover and keep stable in “light wind” (**)</a:t>
+            </a:r>
+          </a:p>
+          <a:p>
+            <a:pPr lvl="1"/>
+            <a:r>
+              <a:rPr lang="en-US" dirty="0" smtClean="0"/>
+              <a:t>Under good condition can capture stable video stream.</a:t>
+            </a:r>
+          </a:p>
+          <a:p>
+            <a:pPr lvl="1"/>
+            <a:r>
+              <a:rPr lang="en-US" dirty="0" smtClean="0"/>
+              <a:t>Can carry &gt;500 grams and hover &gt;30m high.</a:t>
+            </a:r>
+          </a:p>
+          <a:p>
+            <a:pPr lvl="1"/>
+            <a:r>
+              <a:rPr lang="en-US" dirty="0" smtClean="0"/>
+              <a:t>Batteries last ~15 minutes without carrying anything</a:t>
+            </a:r>
+          </a:p>
+          <a:p>
+            <a:pPr lvl="1" eaLnBrk="1" hangingPunct="1"/>
+            <a:endParaRPr lang="en-US" dirty="0" smtClean="0"/>
+          </a:p>
+          <a:p>
+            <a:pPr lvl="1" eaLnBrk="1" hangingPunct="1"/>
+            <a:r>
+              <a:rPr lang="en-US" sz="1200" dirty="0" smtClean="0"/>
+              <a:t>(*</a:t>
+            </a:r>
+            <a:r>
+              <a:rPr lang="en-US" sz="1200" dirty="0" smtClean="0">
+                <a:sym typeface="Wingdings" pitchFamily="2" charset="2"/>
+              </a:rPr>
+              <a:t>)</a:t>
+            </a:r>
+            <a:r>
+              <a:rPr lang="en-US" sz="1200" dirty="0" smtClean="0"/>
+              <a:t> good condition is a condition where wind speed ~ 0m/s, temperature 10 - 30 Celsius,  acceptable humidity.</a:t>
+            </a:r>
+          </a:p>
+          <a:p>
+            <a:pPr lvl="1" eaLnBrk="1" hangingPunct="1"/>
+            <a:r>
+              <a:rPr lang="en-US" sz="1200" dirty="0" smtClean="0"/>
+              <a:t>(**) what is “light wind” will be investigated during the project time.  </a:t>
+            </a:r>
+          </a:p>
+          <a:p>
+            <a:pPr lvl="1"/>
+            <a:endParaRPr lang="en-US" dirty="0" smtClean="0"/>
+          </a:p>
+          <a:p>
             <a:endParaRPr lang="en-US" dirty="0"/>
           </a:p>
         </p:txBody>
@@ -10667,6 +10707,184 @@
                 <a:defRPr/>
               </a:pPr>
               <a:t>15</a:t>
+            </a:fld>
+            <a:endParaRPr lang="en-US" dirty="0"/>
+          </a:p>
+        </p:txBody>
+      </p:sp>
+      <p:sp>
+        <p:nvSpPr>
+          <p:cNvPr id="10" name="Title 1"/>
+          <p:cNvSpPr>
+            <a:spLocks noGrp="1"/>
+          </p:cNvSpPr>
+          <p:nvPr>
+            <p:ph type="title"/>
+          </p:nvPr>
+        </p:nvSpPr>
+        <p:spPr>
+          <a:xfrm>
+            <a:off x="2971800" y="319088"/>
+            <a:ext cx="4876800" cy="563562"/>
+          </a:xfrm>
+        </p:spPr>
+        <p:txBody>
+          <a:bodyPr/>
+          <a:lstStyle/>
+          <a:p>
+            <a:pPr algn="l"/>
+            <a:r>
+              <a:rPr lang="en-US" dirty="0" smtClean="0"/>
+              <a:t>Quadrocopter</a:t>
+            </a:r>
+            <a:endParaRPr lang="en-US" dirty="0"/>
+          </a:p>
+        </p:txBody>
+      </p:sp>
+      <p:sp>
+        <p:nvSpPr>
+          <p:cNvPr id="11" name="Rounded Rectangle 10"/>
+          <p:cNvSpPr/>
+          <p:nvPr/>
+        </p:nvSpPr>
+        <p:spPr>
+          <a:xfrm>
+            <a:off x="304800" y="152400"/>
+            <a:ext cx="2667000" cy="838200"/>
+          </a:xfrm>
+          <a:prstGeom prst="roundRect">
+            <a:avLst/>
+          </a:prstGeom>
+          <a:solidFill>
+            <a:srgbClr val="7030A0"/>
+          </a:solidFill>
+        </p:spPr>
+        <p:style>
+          <a:lnRef idx="3">
+            <a:schemeClr val="lt1"/>
+          </a:lnRef>
+          <a:fillRef idx="1">
+            <a:schemeClr val="dk1"/>
+          </a:fillRef>
+          <a:effectRef idx="1">
+            <a:schemeClr val="dk1"/>
+          </a:effectRef>
+          <a:fontRef idx="minor">
+            <a:schemeClr val="lt1"/>
+          </a:fontRef>
+        </p:style>
+        <p:txBody>
+          <a:bodyPr rtlCol="0" anchor="ctr"/>
+          <a:lstStyle/>
+          <a:p>
+            <a:pPr algn="ctr"/>
+            <a:r>
+              <a:rPr lang="en-US" sz="4000" dirty="0" smtClean="0"/>
+              <a:t>Scope</a:t>
+            </a:r>
+            <a:endParaRPr lang="en-US" sz="4000" dirty="0"/>
+          </a:p>
+        </p:txBody>
+      </p:sp>
+      <p:pic>
+        <p:nvPicPr>
+          <p:cNvPr id="6" name="Picture 5" descr="logo_final.png"/>
+          <p:cNvPicPr>
+            <a:picLocks noChangeAspect="1"/>
+          </p:cNvPicPr>
+          <p:nvPr/>
+        </p:nvPicPr>
+        <p:blipFill>
+          <a:blip r:embed="rId2" cstate="print"/>
+          <a:stretch>
+            <a:fillRect/>
+          </a:stretch>
+        </p:blipFill>
+        <p:spPr>
+          <a:xfrm>
+            <a:off x="8001000" y="0"/>
+            <a:ext cx="1219200" cy="1219200"/>
+          </a:xfrm>
+          <a:prstGeom prst="rect">
+            <a:avLst/>
+          </a:prstGeom>
+        </p:spPr>
+      </p:pic>
+    </p:spTree>
+  </p:cSld>
+  <p:clrMapOvr>
+    <a:masterClrMapping/>
+  </p:clrMapOvr>
+  <p:timing>
+    <p:tnLst>
+      <p:par>
+        <p:cTn id="1" dur="indefinite" restart="never" nodeType="tmRoot"/>
+      </p:par>
+    </p:tnLst>
+  </p:timing>
+</p:sld>
+</file>
+
+<file path=ppt/slides/slide16.xml><?xml version="1.0" encoding="utf-8"?>
+<p:sld xmlns:a="http://schemas.openxmlformats.org/drawingml/2006/main" xmlns:r="http://schemas.openxmlformats.org/officeDocument/2006/relationships" xmlns:p="http://schemas.openxmlformats.org/presentationml/2006/main">
+  <p:cSld>
+    <p:spTree>
+      <p:nvGrpSpPr>
+        <p:cNvPr id="1" name=""/>
+        <p:cNvGrpSpPr/>
+        <p:nvPr/>
+      </p:nvGrpSpPr>
+      <p:grpSpPr>
+        <a:xfrm>
+          <a:off x="0" y="0"/>
+          <a:ext cx="0" cy="0"/>
+          <a:chOff x="0" y="0"/>
+          <a:chExt cx="0" cy="0"/>
+        </a:xfrm>
+      </p:grpSpPr>
+      <p:sp>
+        <p:nvSpPr>
+          <p:cNvPr id="3" name="Content Placeholder 2"/>
+          <p:cNvSpPr>
+            <a:spLocks noGrp="1"/>
+          </p:cNvSpPr>
+          <p:nvPr>
+            <p:ph idx="1"/>
+          </p:nvPr>
+        </p:nvSpPr>
+        <p:spPr/>
+        <p:txBody>
+          <a:bodyPr/>
+          <a:lstStyle/>
+          <a:p>
+            <a:endParaRPr lang="en-US" dirty="0"/>
+          </a:p>
+        </p:txBody>
+      </p:sp>
+      <p:sp>
+        <p:nvSpPr>
+          <p:cNvPr id="4" name="Slide Number Placeholder 3"/>
+          <p:cNvSpPr>
+            <a:spLocks noGrp="1"/>
+          </p:cNvSpPr>
+          <p:nvPr>
+            <p:ph type="sldNum" sz="quarter" idx="12"/>
+          </p:nvPr>
+        </p:nvSpPr>
+        <p:spPr/>
+        <p:txBody>
+          <a:bodyPr/>
+          <a:lstStyle/>
+          <a:p>
+            <a:pPr>
+              <a:defRPr/>
+            </a:pPr>
+            <a:fld id="{20C98071-8A9B-444A-806A-782BE84EBE4B}" type="slidenum">
+              <a:rPr lang="en-US" smtClean="0"/>
+              <a:pPr>
+                <a:defRPr/>
+              </a:pPr>
+              <a:t>16</a:t>
             </a:fld>
             <a:endParaRPr lang="en-US" dirty="0"/>
           </a:p>
@@ -10817,7 +11035,7 @@
 </p:sld>
 </file>
 
-<file path=ppt/slides/slide16.xml><?xml version="1.0" encoding="utf-8"?>
+<file path=ppt/slides/slide17.xml><?xml version="1.0" encoding="utf-8"?>
 <p:sld xmlns:a="http://schemas.openxmlformats.org/drawingml/2006/main" xmlns:r="http://schemas.openxmlformats.org/officeDocument/2006/relationships" xmlns:p="http://schemas.openxmlformats.org/presentationml/2006/main">
   <p:cSld>
     <p:spTree>
@@ -10918,7 +11136,7 @@
             <a:fld id="{DD4B9F40-BE4A-482E-AC11-0BCA25117457}" type="slidenum">
               <a:rPr lang="en-US" smtClean="0"/>
               <a:pPr/>
-              <a:t>16</a:t>
+              <a:t>17</a:t>
             </a:fld>
             <a:endParaRPr lang="en-US" dirty="0" smtClean="0"/>
           </a:p>
@@ -11037,7 +11255,7 @@
 </p:sld>
 </file>
 
-<file path=ppt/slides/slide17.xml><?xml version="1.0" encoding="utf-8"?>
+<file path=ppt/slides/slide18.xml><?xml version="1.0" encoding="utf-8"?>
 <p:sld xmlns:a="http://schemas.openxmlformats.org/drawingml/2006/main" xmlns:r="http://schemas.openxmlformats.org/officeDocument/2006/relationships" xmlns:p="http://schemas.openxmlformats.org/presentationml/2006/main">
   <p:cSld>
     <p:spTree>
@@ -11107,7 +11325,7 @@
             <a:fld id="{F9CAEF3E-DFC5-4437-9FE0-5D1A2F7BE344}" type="slidenum">
               <a:rPr lang="en-US" smtClean="0"/>
               <a:pPr/>
-              <a:t>17</a:t>
+              <a:t>18</a:t>
             </a:fld>
             <a:endParaRPr lang="en-US" dirty="0" smtClean="0"/>
           </a:p>
@@ -12541,7 +12759,7 @@
 </p:sld>
 </file>
 
-<file path=ppt/slides/slide18.xml><?xml version="1.0" encoding="utf-8"?>
+<file path=ppt/slides/slide19.xml><?xml version="1.0" encoding="utf-8"?>
 <p:sld xmlns:a="http://schemas.openxmlformats.org/drawingml/2006/main" xmlns:r="http://schemas.openxmlformats.org/officeDocument/2006/relationships" xmlns:p="http://schemas.openxmlformats.org/presentationml/2006/main">
   <p:cSld>
     <p:spTree>
@@ -12754,7 +12972,7 @@
               <a:pPr>
                 <a:defRPr/>
               </a:pPr>
-              <a:t>18</a:t>
+              <a:t>19</a:t>
             </a:fld>
             <a:endParaRPr lang="en-US" dirty="0"/>
           </a:p>
@@ -12873,7 +13091,1313 @@
 </p:sld>
 </file>
 
-<file path=ppt/slides/slide19.xml><?xml version="1.0" encoding="utf-8"?>
+<file path=ppt/slides/slide2.xml><?xml version="1.0" encoding="utf-8"?>
+<p:sld xmlns:a="http://schemas.openxmlformats.org/drawingml/2006/main" xmlns:r="http://schemas.openxmlformats.org/officeDocument/2006/relationships" xmlns:p="http://schemas.openxmlformats.org/presentationml/2006/main">
+  <p:cSld>
+    <p:spTree>
+      <p:nvGrpSpPr>
+        <p:cNvPr id="1" name=""/>
+        <p:cNvGrpSpPr/>
+        <p:nvPr/>
+      </p:nvGrpSpPr>
+      <p:grpSpPr>
+        <a:xfrm>
+          <a:off x="0" y="0"/>
+          <a:ext cx="0" cy="0"/>
+          <a:chOff x="0" y="0"/>
+          <a:chExt cx="0" cy="0"/>
+        </a:xfrm>
+      </p:grpSpPr>
+      <p:sp>
+        <p:nvSpPr>
+          <p:cNvPr id="4098" name="Rectangle 2"/>
+          <p:cNvSpPr>
+            <a:spLocks noGrp="1" noChangeArrowheads="1"/>
+          </p:cNvSpPr>
+          <p:nvPr>
+            <p:ph type="title"/>
+          </p:nvPr>
+        </p:nvSpPr>
+        <p:spPr/>
+        <p:txBody>
+          <a:bodyPr/>
+          <a:lstStyle/>
+          <a:p>
+            <a:pPr algn="l" eaLnBrk="1" hangingPunct="1"/>
+            <a:r>
+              <a:rPr lang="en-US" sz="4000" dirty="0" smtClean="0"/>
+              <a:t>Contents</a:t>
+            </a:r>
+            <a:endParaRPr lang="en-US" sz="2400" dirty="0" smtClean="0">
+              <a:solidFill>
+                <a:schemeClr val="accent1"/>
+              </a:solidFill>
+            </a:endParaRPr>
+          </a:p>
+        </p:txBody>
+      </p:sp>
+      <p:grpSp>
+        <p:nvGrpSpPr>
+          <p:cNvPr id="4099" name="Group 3"/>
+          <p:cNvGrpSpPr>
+            <a:grpSpLocks/>
+          </p:cNvGrpSpPr>
+          <p:nvPr/>
+        </p:nvGrpSpPr>
+        <p:grpSpPr bwMode="auto">
+          <a:xfrm>
+            <a:off x="1828800" y="1752600"/>
+            <a:ext cx="762000" cy="665163"/>
+            <a:chOff x="1110" y="2656"/>
+            <a:chExt cx="1549" cy="1351"/>
+          </a:xfrm>
+        </p:grpSpPr>
+        <p:sp>
+          <p:nvSpPr>
+            <p:cNvPr id="4132" name="AutoShape 4"/>
+            <p:cNvSpPr>
+              <a:spLocks noChangeArrowheads="1"/>
+            </p:cNvSpPr>
+            <p:nvPr/>
+          </p:nvSpPr>
+          <p:spPr bwMode="gray">
+            <a:xfrm>
+              <a:off x="1123" y="2679"/>
+              <a:ext cx="1536" cy="1328"/>
+            </a:xfrm>
+            <a:prstGeom prst="hexagon">
+              <a:avLst>
+                <a:gd name="adj" fmla="val 28916"/>
+                <a:gd name="vf" fmla="val 115470"/>
+              </a:avLst>
+            </a:prstGeom>
+            <a:solidFill>
+              <a:srgbClr val="808080"/>
+            </a:solidFill>
+            <a:ln w="9525">
+              <a:noFill/>
+              <a:miter lim="800000"/>
+              <a:headEnd/>
+              <a:tailEnd/>
+            </a:ln>
+          </p:spPr>
+          <p:txBody>
+            <a:bodyPr wrap="none" anchor="ctr"/>
+            <a:lstStyle/>
+            <a:p>
+              <a:endParaRPr lang="en-US" dirty="0"/>
+            </a:p>
+          </p:txBody>
+        </p:sp>
+        <p:sp>
+          <p:nvSpPr>
+            <p:cNvPr id="4133" name="AutoShape 5"/>
+            <p:cNvSpPr>
+              <a:spLocks noChangeArrowheads="1"/>
+            </p:cNvSpPr>
+            <p:nvPr/>
+          </p:nvSpPr>
+          <p:spPr bwMode="gray">
+            <a:xfrm>
+              <a:off x="1110" y="2656"/>
+              <a:ext cx="1536" cy="1328"/>
+            </a:xfrm>
+            <a:prstGeom prst="hexagon">
+              <a:avLst>
+                <a:gd name="adj" fmla="val 28916"/>
+                <a:gd name="vf" fmla="val 115470"/>
+              </a:avLst>
+            </a:prstGeom>
+            <a:gradFill rotWithShape="1">
+              <a:gsLst>
+                <a:gs pos="0">
+                  <a:srgbClr val="E6E6E6"/>
+                </a:gs>
+                <a:gs pos="7500">
+                  <a:srgbClr val="7D8496"/>
+                </a:gs>
+                <a:gs pos="26500">
+                  <a:srgbClr val="E6E6E6"/>
+                </a:gs>
+                <a:gs pos="34000">
+                  <a:srgbClr val="7D8496"/>
+                </a:gs>
+                <a:gs pos="46500">
+                  <a:srgbClr val="E6E6E6"/>
+                </a:gs>
+                <a:gs pos="50000">
+                  <a:srgbClr val="FFFFFF"/>
+                </a:gs>
+                <a:gs pos="53500">
+                  <a:srgbClr val="E6E6E6"/>
+                </a:gs>
+                <a:gs pos="66000">
+                  <a:srgbClr val="7D8496"/>
+                </a:gs>
+                <a:gs pos="73500">
+                  <a:srgbClr val="E6E6E6"/>
+                </a:gs>
+                <a:gs pos="92500">
+                  <a:srgbClr val="7D8496"/>
+                </a:gs>
+                <a:gs pos="100000">
+                  <a:srgbClr val="E6E6E6"/>
+                </a:gs>
+              </a:gsLst>
+              <a:lin ang="2700000" scaled="1"/>
+            </a:gradFill>
+            <a:ln w="9525">
+              <a:solidFill>
+                <a:srgbClr val="C0C0C0"/>
+              </a:solidFill>
+              <a:miter lim="800000"/>
+              <a:headEnd/>
+              <a:tailEnd/>
+            </a:ln>
+          </p:spPr>
+          <p:txBody>
+            <a:bodyPr wrap="none" anchor="ctr"/>
+            <a:lstStyle/>
+            <a:p>
+              <a:endParaRPr lang="en-US" dirty="0"/>
+            </a:p>
+          </p:txBody>
+        </p:sp>
+        <p:sp>
+          <p:nvSpPr>
+            <p:cNvPr id="40966" name="AutoShape 6"/>
+            <p:cNvSpPr>
+              <a:spLocks noChangeArrowheads="1"/>
+            </p:cNvSpPr>
+            <p:nvPr/>
+          </p:nvSpPr>
+          <p:spPr bwMode="gray">
+            <a:xfrm>
+              <a:off x="1200" y="2737"/>
+              <a:ext cx="1349" cy="1167"/>
+            </a:xfrm>
+            <a:prstGeom prst="hexagon">
+              <a:avLst>
+                <a:gd name="adj" fmla="val 28896"/>
+                <a:gd name="vf" fmla="val 115470"/>
+              </a:avLst>
+            </a:prstGeom>
+            <a:gradFill rotWithShape="1">
+              <a:gsLst>
+                <a:gs pos="0">
+                  <a:schemeClr val="hlink">
+                    <a:gamma/>
+                    <a:shade val="46275"/>
+                    <a:invGamma/>
+                  </a:schemeClr>
+                </a:gs>
+                <a:gs pos="100000">
+                  <a:schemeClr val="hlink"/>
+                </a:gs>
+              </a:gsLst>
+              <a:lin ang="2700000" scaled="1"/>
+            </a:gradFill>
+            <a:ln w="9525">
+              <a:solidFill>
+                <a:schemeClr val="tx1"/>
+              </a:solidFill>
+              <a:miter lim="800000"/>
+              <a:headEnd/>
+              <a:tailEnd/>
+            </a:ln>
+            <a:effectLst/>
+          </p:spPr>
+          <p:txBody>
+            <a:bodyPr wrap="none" anchor="ctr"/>
+            <a:lstStyle/>
+            <a:p>
+              <a:pPr>
+                <a:defRPr/>
+              </a:pPr>
+              <a:endParaRPr lang="en-US" dirty="0"/>
+            </a:p>
+          </p:txBody>
+        </p:sp>
+      </p:grpSp>
+      <p:grpSp>
+        <p:nvGrpSpPr>
+          <p:cNvPr id="4100" name="Group 7"/>
+          <p:cNvGrpSpPr>
+            <a:grpSpLocks/>
+          </p:cNvGrpSpPr>
+          <p:nvPr/>
+        </p:nvGrpSpPr>
+        <p:grpSpPr bwMode="auto">
+          <a:xfrm>
+            <a:off x="1828800" y="2667000"/>
+            <a:ext cx="762000" cy="665163"/>
+            <a:chOff x="3174" y="2656"/>
+            <a:chExt cx="1549" cy="1351"/>
+          </a:xfrm>
+        </p:grpSpPr>
+        <p:sp>
+          <p:nvSpPr>
+            <p:cNvPr id="4129" name="AutoShape 8"/>
+            <p:cNvSpPr>
+              <a:spLocks noChangeArrowheads="1"/>
+            </p:cNvSpPr>
+            <p:nvPr/>
+          </p:nvSpPr>
+          <p:spPr bwMode="gray">
+            <a:xfrm>
+              <a:off x="3187" y="2679"/>
+              <a:ext cx="1536" cy="1328"/>
+            </a:xfrm>
+            <a:prstGeom prst="hexagon">
+              <a:avLst>
+                <a:gd name="adj" fmla="val 28916"/>
+                <a:gd name="vf" fmla="val 115470"/>
+              </a:avLst>
+            </a:prstGeom>
+            <a:solidFill>
+              <a:srgbClr val="808080"/>
+            </a:solidFill>
+            <a:ln w="9525">
+              <a:noFill/>
+              <a:miter lim="800000"/>
+              <a:headEnd/>
+              <a:tailEnd/>
+            </a:ln>
+          </p:spPr>
+          <p:txBody>
+            <a:bodyPr wrap="none" anchor="ctr"/>
+            <a:lstStyle/>
+            <a:p>
+              <a:endParaRPr lang="en-US" dirty="0"/>
+            </a:p>
+          </p:txBody>
+        </p:sp>
+        <p:sp>
+          <p:nvSpPr>
+            <p:cNvPr id="4130" name="AutoShape 9"/>
+            <p:cNvSpPr>
+              <a:spLocks noChangeArrowheads="1"/>
+            </p:cNvSpPr>
+            <p:nvPr/>
+          </p:nvSpPr>
+          <p:spPr bwMode="gray">
+            <a:xfrm>
+              <a:off x="3174" y="2656"/>
+              <a:ext cx="1536" cy="1328"/>
+            </a:xfrm>
+            <a:prstGeom prst="hexagon">
+              <a:avLst>
+                <a:gd name="adj" fmla="val 28916"/>
+                <a:gd name="vf" fmla="val 115470"/>
+              </a:avLst>
+            </a:prstGeom>
+            <a:gradFill rotWithShape="1">
+              <a:gsLst>
+                <a:gs pos="0">
+                  <a:srgbClr val="E6E6E6"/>
+                </a:gs>
+                <a:gs pos="7500">
+                  <a:srgbClr val="7D8496"/>
+                </a:gs>
+                <a:gs pos="26500">
+                  <a:srgbClr val="E6E6E6"/>
+                </a:gs>
+                <a:gs pos="34000">
+                  <a:srgbClr val="7D8496"/>
+                </a:gs>
+                <a:gs pos="46500">
+                  <a:srgbClr val="E6E6E6"/>
+                </a:gs>
+                <a:gs pos="50000">
+                  <a:srgbClr val="FFFFFF"/>
+                </a:gs>
+                <a:gs pos="53500">
+                  <a:srgbClr val="E6E6E6"/>
+                </a:gs>
+                <a:gs pos="66000">
+                  <a:srgbClr val="7D8496"/>
+                </a:gs>
+                <a:gs pos="73500">
+                  <a:srgbClr val="E6E6E6"/>
+                </a:gs>
+                <a:gs pos="92500">
+                  <a:srgbClr val="7D8496"/>
+                </a:gs>
+                <a:gs pos="100000">
+                  <a:srgbClr val="E6E6E6"/>
+                </a:gs>
+              </a:gsLst>
+              <a:lin ang="2700000" scaled="1"/>
+            </a:gradFill>
+            <a:ln w="9525">
+              <a:solidFill>
+                <a:srgbClr val="C0C0C0"/>
+              </a:solidFill>
+              <a:miter lim="800000"/>
+              <a:headEnd/>
+              <a:tailEnd/>
+            </a:ln>
+          </p:spPr>
+          <p:txBody>
+            <a:bodyPr wrap="none" anchor="ctr"/>
+            <a:lstStyle/>
+            <a:p>
+              <a:endParaRPr lang="en-US" dirty="0"/>
+            </a:p>
+          </p:txBody>
+        </p:sp>
+        <p:sp>
+          <p:nvSpPr>
+            <p:cNvPr id="40970" name="AutoShape 10"/>
+            <p:cNvSpPr>
+              <a:spLocks noChangeArrowheads="1"/>
+            </p:cNvSpPr>
+            <p:nvPr/>
+          </p:nvSpPr>
+          <p:spPr bwMode="gray">
+            <a:xfrm>
+              <a:off x="3264" y="2737"/>
+              <a:ext cx="1349" cy="1167"/>
+            </a:xfrm>
+            <a:prstGeom prst="hexagon">
+              <a:avLst>
+                <a:gd name="adj" fmla="val 28896"/>
+                <a:gd name="vf" fmla="val 115470"/>
+              </a:avLst>
+            </a:prstGeom>
+            <a:gradFill rotWithShape="1">
+              <a:gsLst>
+                <a:gs pos="0">
+                  <a:schemeClr val="accent1">
+                    <a:gamma/>
+                    <a:shade val="46275"/>
+                    <a:invGamma/>
+                  </a:schemeClr>
+                </a:gs>
+                <a:gs pos="100000">
+                  <a:schemeClr val="accent1"/>
+                </a:gs>
+              </a:gsLst>
+              <a:lin ang="2700000" scaled="1"/>
+            </a:gradFill>
+            <a:ln w="9525">
+              <a:solidFill>
+                <a:schemeClr val="tx1"/>
+              </a:solidFill>
+              <a:miter lim="800000"/>
+              <a:headEnd/>
+              <a:tailEnd/>
+            </a:ln>
+            <a:effectLst/>
+          </p:spPr>
+          <p:txBody>
+            <a:bodyPr wrap="none" anchor="ctr"/>
+            <a:lstStyle/>
+            <a:p>
+              <a:pPr>
+                <a:defRPr/>
+              </a:pPr>
+              <a:endParaRPr lang="en-US" dirty="0"/>
+            </a:p>
+          </p:txBody>
+        </p:sp>
+      </p:grpSp>
+      <p:sp>
+        <p:nvSpPr>
+          <p:cNvPr id="4101" name="Line 11"/>
+          <p:cNvSpPr>
+            <a:spLocks noChangeShapeType="1"/>
+          </p:cNvSpPr>
+          <p:nvPr/>
+        </p:nvSpPr>
+        <p:spPr bwMode="auto">
+          <a:xfrm>
+            <a:off x="2438400" y="2362200"/>
+            <a:ext cx="4800600" cy="0"/>
+          </a:xfrm>
+          <a:prstGeom prst="line">
+            <a:avLst/>
+          </a:prstGeom>
+          <a:noFill/>
+          <a:ln w="25400">
+            <a:solidFill>
+              <a:srgbClr val="C0C0C0"/>
+            </a:solidFill>
+            <a:prstDash val="sysDot"/>
+            <a:round/>
+            <a:headEnd/>
+            <a:tailEnd type="oval" w="med" len="med"/>
+          </a:ln>
+        </p:spPr>
+        <p:txBody>
+          <a:bodyPr wrap="none" anchor="ctr"/>
+          <a:lstStyle/>
+          <a:p>
+            <a:endParaRPr lang="en-US" dirty="0"/>
+          </a:p>
+        </p:txBody>
+      </p:sp>
+      <p:sp>
+        <p:nvSpPr>
+          <p:cNvPr id="4102" name="Text Box 12"/>
+          <p:cNvSpPr txBox="1">
+            <a:spLocks noChangeArrowheads="1"/>
+          </p:cNvSpPr>
+          <p:nvPr/>
+        </p:nvSpPr>
+        <p:spPr bwMode="auto">
+          <a:xfrm>
+            <a:off x="3276600" y="1828800"/>
+            <a:ext cx="784189" cy="461665"/>
+          </a:xfrm>
+          <a:prstGeom prst="rect">
+            <a:avLst/>
+          </a:prstGeom>
+          <a:noFill/>
+          <a:ln w="9525" algn="ctr">
+            <a:noFill/>
+            <a:miter lim="800000"/>
+            <a:headEnd/>
+            <a:tailEnd/>
+          </a:ln>
+        </p:spPr>
+        <p:txBody>
+          <a:bodyPr wrap="none">
+            <a:spAutoFit/>
+          </a:bodyPr>
+          <a:lstStyle/>
+          <a:p>
+            <a:pPr eaLnBrk="0" hangingPunct="0"/>
+            <a:r>
+              <a:rPr lang="en-US" sz="2400" dirty="0" smtClean="0"/>
+              <a:t>Idea</a:t>
+            </a:r>
+            <a:endParaRPr lang="en-US" sz="2400" dirty="0"/>
+          </a:p>
+        </p:txBody>
+      </p:sp>
+      <p:sp>
+        <p:nvSpPr>
+          <p:cNvPr id="4103" name="Text Box 13"/>
+          <p:cNvSpPr txBox="1">
+            <a:spLocks noChangeArrowheads="1"/>
+          </p:cNvSpPr>
+          <p:nvPr/>
+        </p:nvSpPr>
+        <p:spPr bwMode="gray">
+          <a:xfrm>
+            <a:off x="2025650" y="1851025"/>
+            <a:ext cx="354013" cy="457200"/>
+          </a:xfrm>
+          <a:prstGeom prst="rect">
+            <a:avLst/>
+          </a:prstGeom>
+          <a:noFill/>
+          <a:ln w="9525" algn="ctr">
+            <a:noFill/>
+            <a:miter lim="800000"/>
+            <a:headEnd/>
+            <a:tailEnd/>
+          </a:ln>
+        </p:spPr>
+        <p:txBody>
+          <a:bodyPr wrap="none">
+            <a:spAutoFit/>
+          </a:bodyPr>
+          <a:lstStyle/>
+          <a:p>
+            <a:pPr algn="ctr" eaLnBrk="0" hangingPunct="0"/>
+            <a:r>
+              <a:rPr lang="en-US" sz="2400" b="1" dirty="0">
+                <a:solidFill>
+                  <a:schemeClr val="bg1"/>
+                </a:solidFill>
+              </a:rPr>
+              <a:t>1</a:t>
+            </a:r>
+          </a:p>
+        </p:txBody>
+      </p:sp>
+      <p:sp>
+        <p:nvSpPr>
+          <p:cNvPr id="4104" name="Line 14"/>
+          <p:cNvSpPr>
+            <a:spLocks noChangeShapeType="1"/>
+          </p:cNvSpPr>
+          <p:nvPr/>
+        </p:nvSpPr>
+        <p:spPr bwMode="auto">
+          <a:xfrm>
+            <a:off x="2438400" y="3276600"/>
+            <a:ext cx="4800600" cy="0"/>
+          </a:xfrm>
+          <a:prstGeom prst="line">
+            <a:avLst/>
+          </a:prstGeom>
+          <a:noFill/>
+          <a:ln w="25400">
+            <a:solidFill>
+              <a:srgbClr val="C0C0C0"/>
+            </a:solidFill>
+            <a:prstDash val="sysDot"/>
+            <a:round/>
+            <a:headEnd/>
+            <a:tailEnd type="oval" w="med" len="med"/>
+          </a:ln>
+        </p:spPr>
+        <p:txBody>
+          <a:bodyPr wrap="none" anchor="ctr"/>
+          <a:lstStyle/>
+          <a:p>
+            <a:endParaRPr lang="en-US" dirty="0"/>
+          </a:p>
+        </p:txBody>
+      </p:sp>
+      <p:sp>
+        <p:nvSpPr>
+          <p:cNvPr id="4105" name="Text Box 15"/>
+          <p:cNvSpPr txBox="1">
+            <a:spLocks noChangeArrowheads="1"/>
+          </p:cNvSpPr>
+          <p:nvPr/>
+        </p:nvSpPr>
+        <p:spPr bwMode="auto">
+          <a:xfrm>
+            <a:off x="3276600" y="2743200"/>
+            <a:ext cx="1468672" cy="461665"/>
+          </a:xfrm>
+          <a:prstGeom prst="rect">
+            <a:avLst/>
+          </a:prstGeom>
+          <a:noFill/>
+          <a:ln w="9525" algn="ctr">
+            <a:noFill/>
+            <a:miter lim="800000"/>
+            <a:headEnd/>
+            <a:tailEnd/>
+          </a:ln>
+        </p:spPr>
+        <p:txBody>
+          <a:bodyPr wrap="none">
+            <a:spAutoFit/>
+          </a:bodyPr>
+          <a:lstStyle/>
+          <a:p>
+            <a:pPr eaLnBrk="0" hangingPunct="0"/>
+            <a:r>
+              <a:rPr lang="en-US" sz="2400" dirty="0" smtClean="0"/>
+              <a:t>Overview</a:t>
+            </a:r>
+            <a:endParaRPr lang="en-US" sz="2400" dirty="0"/>
+          </a:p>
+        </p:txBody>
+      </p:sp>
+      <p:sp>
+        <p:nvSpPr>
+          <p:cNvPr id="4106" name="Text Box 16"/>
+          <p:cNvSpPr txBox="1">
+            <a:spLocks noChangeArrowheads="1"/>
+          </p:cNvSpPr>
+          <p:nvPr/>
+        </p:nvSpPr>
+        <p:spPr bwMode="gray">
+          <a:xfrm>
+            <a:off x="2025650" y="2765425"/>
+            <a:ext cx="354013" cy="457200"/>
+          </a:xfrm>
+          <a:prstGeom prst="rect">
+            <a:avLst/>
+          </a:prstGeom>
+          <a:noFill/>
+          <a:ln w="9525" algn="ctr">
+            <a:noFill/>
+            <a:miter lim="800000"/>
+            <a:headEnd/>
+            <a:tailEnd/>
+          </a:ln>
+        </p:spPr>
+        <p:txBody>
+          <a:bodyPr wrap="none">
+            <a:spAutoFit/>
+          </a:bodyPr>
+          <a:lstStyle/>
+          <a:p>
+            <a:pPr algn="ctr" eaLnBrk="0" hangingPunct="0"/>
+            <a:r>
+              <a:rPr lang="en-US" sz="2400" b="1" dirty="0">
+                <a:solidFill>
+                  <a:schemeClr val="bg1"/>
+                </a:solidFill>
+              </a:rPr>
+              <a:t>2</a:t>
+            </a:r>
+          </a:p>
+        </p:txBody>
+      </p:sp>
+      <p:grpSp>
+        <p:nvGrpSpPr>
+          <p:cNvPr id="4107" name="Group 17"/>
+          <p:cNvGrpSpPr>
+            <a:grpSpLocks/>
+          </p:cNvGrpSpPr>
+          <p:nvPr/>
+        </p:nvGrpSpPr>
+        <p:grpSpPr bwMode="auto">
+          <a:xfrm>
+            <a:off x="1828800" y="3559175"/>
+            <a:ext cx="762000" cy="665163"/>
+            <a:chOff x="1110" y="2656"/>
+            <a:chExt cx="1549" cy="1351"/>
+          </a:xfrm>
+        </p:grpSpPr>
+        <p:sp>
+          <p:nvSpPr>
+            <p:cNvPr id="4126" name="AutoShape 18"/>
+            <p:cNvSpPr>
+              <a:spLocks noChangeArrowheads="1"/>
+            </p:cNvSpPr>
+            <p:nvPr/>
+          </p:nvSpPr>
+          <p:spPr bwMode="gray">
+            <a:xfrm>
+              <a:off x="1123" y="2679"/>
+              <a:ext cx="1536" cy="1328"/>
+            </a:xfrm>
+            <a:prstGeom prst="hexagon">
+              <a:avLst>
+                <a:gd name="adj" fmla="val 28916"/>
+                <a:gd name="vf" fmla="val 115470"/>
+              </a:avLst>
+            </a:prstGeom>
+            <a:solidFill>
+              <a:srgbClr val="808080"/>
+            </a:solidFill>
+            <a:ln w="9525">
+              <a:noFill/>
+              <a:miter lim="800000"/>
+              <a:headEnd/>
+              <a:tailEnd/>
+            </a:ln>
+          </p:spPr>
+          <p:txBody>
+            <a:bodyPr wrap="none" anchor="ctr"/>
+            <a:lstStyle/>
+            <a:p>
+              <a:endParaRPr lang="en-US" dirty="0"/>
+            </a:p>
+          </p:txBody>
+        </p:sp>
+        <p:sp>
+          <p:nvSpPr>
+            <p:cNvPr id="4127" name="AutoShape 19"/>
+            <p:cNvSpPr>
+              <a:spLocks noChangeArrowheads="1"/>
+            </p:cNvSpPr>
+            <p:nvPr/>
+          </p:nvSpPr>
+          <p:spPr bwMode="gray">
+            <a:xfrm>
+              <a:off x="1110" y="2656"/>
+              <a:ext cx="1536" cy="1328"/>
+            </a:xfrm>
+            <a:prstGeom prst="hexagon">
+              <a:avLst>
+                <a:gd name="adj" fmla="val 28916"/>
+                <a:gd name="vf" fmla="val 115470"/>
+              </a:avLst>
+            </a:prstGeom>
+            <a:gradFill rotWithShape="1">
+              <a:gsLst>
+                <a:gs pos="0">
+                  <a:srgbClr val="E6E6E6"/>
+                </a:gs>
+                <a:gs pos="7500">
+                  <a:srgbClr val="7D8496"/>
+                </a:gs>
+                <a:gs pos="26500">
+                  <a:srgbClr val="E6E6E6"/>
+                </a:gs>
+                <a:gs pos="34000">
+                  <a:srgbClr val="7D8496"/>
+                </a:gs>
+                <a:gs pos="46500">
+                  <a:srgbClr val="E6E6E6"/>
+                </a:gs>
+                <a:gs pos="50000">
+                  <a:srgbClr val="FFFFFF"/>
+                </a:gs>
+                <a:gs pos="53500">
+                  <a:srgbClr val="E6E6E6"/>
+                </a:gs>
+                <a:gs pos="66000">
+                  <a:srgbClr val="7D8496"/>
+                </a:gs>
+                <a:gs pos="73500">
+                  <a:srgbClr val="E6E6E6"/>
+                </a:gs>
+                <a:gs pos="92500">
+                  <a:srgbClr val="7D8496"/>
+                </a:gs>
+                <a:gs pos="100000">
+                  <a:srgbClr val="E6E6E6"/>
+                </a:gs>
+              </a:gsLst>
+              <a:lin ang="2700000" scaled="1"/>
+            </a:gradFill>
+            <a:ln w="9525">
+              <a:solidFill>
+                <a:srgbClr val="C0C0C0"/>
+              </a:solidFill>
+              <a:miter lim="800000"/>
+              <a:headEnd/>
+              <a:tailEnd/>
+            </a:ln>
+          </p:spPr>
+          <p:txBody>
+            <a:bodyPr wrap="none" anchor="ctr"/>
+            <a:lstStyle/>
+            <a:p>
+              <a:endParaRPr lang="en-US" dirty="0"/>
+            </a:p>
+          </p:txBody>
+        </p:sp>
+        <p:sp>
+          <p:nvSpPr>
+            <p:cNvPr id="40980" name="AutoShape 20"/>
+            <p:cNvSpPr>
+              <a:spLocks noChangeArrowheads="1"/>
+            </p:cNvSpPr>
+            <p:nvPr/>
+          </p:nvSpPr>
+          <p:spPr bwMode="gray">
+            <a:xfrm>
+              <a:off x="1200" y="2737"/>
+              <a:ext cx="1349" cy="1167"/>
+            </a:xfrm>
+            <a:prstGeom prst="hexagon">
+              <a:avLst>
+                <a:gd name="adj" fmla="val 28896"/>
+                <a:gd name="vf" fmla="val 115470"/>
+              </a:avLst>
+            </a:prstGeom>
+            <a:gradFill rotWithShape="1">
+              <a:gsLst>
+                <a:gs pos="0">
+                  <a:schemeClr val="hlink">
+                    <a:gamma/>
+                    <a:shade val="46275"/>
+                    <a:invGamma/>
+                  </a:schemeClr>
+                </a:gs>
+                <a:gs pos="100000">
+                  <a:schemeClr val="hlink"/>
+                </a:gs>
+              </a:gsLst>
+              <a:lin ang="2700000" scaled="1"/>
+            </a:gradFill>
+            <a:ln w="9525">
+              <a:solidFill>
+                <a:schemeClr val="tx1"/>
+              </a:solidFill>
+              <a:miter lim="800000"/>
+              <a:headEnd/>
+              <a:tailEnd/>
+            </a:ln>
+            <a:effectLst/>
+          </p:spPr>
+          <p:txBody>
+            <a:bodyPr wrap="none" anchor="ctr"/>
+            <a:lstStyle/>
+            <a:p>
+              <a:pPr>
+                <a:defRPr/>
+              </a:pPr>
+              <a:endParaRPr lang="en-US" dirty="0"/>
+            </a:p>
+          </p:txBody>
+        </p:sp>
+      </p:grpSp>
+      <p:grpSp>
+        <p:nvGrpSpPr>
+          <p:cNvPr id="4108" name="Group 21"/>
+          <p:cNvGrpSpPr>
+            <a:grpSpLocks/>
+          </p:cNvGrpSpPr>
+          <p:nvPr/>
+        </p:nvGrpSpPr>
+        <p:grpSpPr bwMode="auto">
+          <a:xfrm>
+            <a:off x="1828800" y="4473575"/>
+            <a:ext cx="762000" cy="665163"/>
+            <a:chOff x="3174" y="2656"/>
+            <a:chExt cx="1549" cy="1351"/>
+          </a:xfrm>
+        </p:grpSpPr>
+        <p:sp>
+          <p:nvSpPr>
+            <p:cNvPr id="4123" name="AutoShape 22"/>
+            <p:cNvSpPr>
+              <a:spLocks noChangeArrowheads="1"/>
+            </p:cNvSpPr>
+            <p:nvPr/>
+          </p:nvSpPr>
+          <p:spPr bwMode="gray">
+            <a:xfrm>
+              <a:off x="3187" y="2679"/>
+              <a:ext cx="1536" cy="1328"/>
+            </a:xfrm>
+            <a:prstGeom prst="hexagon">
+              <a:avLst>
+                <a:gd name="adj" fmla="val 28916"/>
+                <a:gd name="vf" fmla="val 115470"/>
+              </a:avLst>
+            </a:prstGeom>
+            <a:solidFill>
+              <a:srgbClr val="808080"/>
+            </a:solidFill>
+            <a:ln w="9525">
+              <a:noFill/>
+              <a:miter lim="800000"/>
+              <a:headEnd/>
+              <a:tailEnd/>
+            </a:ln>
+          </p:spPr>
+          <p:txBody>
+            <a:bodyPr wrap="none" anchor="ctr"/>
+            <a:lstStyle/>
+            <a:p>
+              <a:endParaRPr lang="en-US" dirty="0"/>
+            </a:p>
+          </p:txBody>
+        </p:sp>
+        <p:sp>
+          <p:nvSpPr>
+            <p:cNvPr id="4124" name="AutoShape 23"/>
+            <p:cNvSpPr>
+              <a:spLocks noChangeArrowheads="1"/>
+            </p:cNvSpPr>
+            <p:nvPr/>
+          </p:nvSpPr>
+          <p:spPr bwMode="gray">
+            <a:xfrm>
+              <a:off x="3174" y="2656"/>
+              <a:ext cx="1536" cy="1328"/>
+            </a:xfrm>
+            <a:prstGeom prst="hexagon">
+              <a:avLst>
+                <a:gd name="adj" fmla="val 28916"/>
+                <a:gd name="vf" fmla="val 115470"/>
+              </a:avLst>
+            </a:prstGeom>
+            <a:gradFill rotWithShape="1">
+              <a:gsLst>
+                <a:gs pos="0">
+                  <a:srgbClr val="E6E6E6"/>
+                </a:gs>
+                <a:gs pos="7500">
+                  <a:srgbClr val="7D8496"/>
+                </a:gs>
+                <a:gs pos="26500">
+                  <a:srgbClr val="E6E6E6"/>
+                </a:gs>
+                <a:gs pos="34000">
+                  <a:srgbClr val="7D8496"/>
+                </a:gs>
+                <a:gs pos="46500">
+                  <a:srgbClr val="E6E6E6"/>
+                </a:gs>
+                <a:gs pos="50000">
+                  <a:srgbClr val="FFFFFF"/>
+                </a:gs>
+                <a:gs pos="53500">
+                  <a:srgbClr val="E6E6E6"/>
+                </a:gs>
+                <a:gs pos="66000">
+                  <a:srgbClr val="7D8496"/>
+                </a:gs>
+                <a:gs pos="73500">
+                  <a:srgbClr val="E6E6E6"/>
+                </a:gs>
+                <a:gs pos="92500">
+                  <a:srgbClr val="7D8496"/>
+                </a:gs>
+                <a:gs pos="100000">
+                  <a:srgbClr val="E6E6E6"/>
+                </a:gs>
+              </a:gsLst>
+              <a:lin ang="2700000" scaled="1"/>
+            </a:gradFill>
+            <a:ln w="9525">
+              <a:solidFill>
+                <a:srgbClr val="C0C0C0"/>
+              </a:solidFill>
+              <a:miter lim="800000"/>
+              <a:headEnd/>
+              <a:tailEnd/>
+            </a:ln>
+          </p:spPr>
+          <p:txBody>
+            <a:bodyPr wrap="none" anchor="ctr"/>
+            <a:lstStyle/>
+            <a:p>
+              <a:endParaRPr lang="en-US" dirty="0"/>
+            </a:p>
+          </p:txBody>
+        </p:sp>
+        <p:sp>
+          <p:nvSpPr>
+            <p:cNvPr id="40984" name="AutoShape 24"/>
+            <p:cNvSpPr>
+              <a:spLocks noChangeArrowheads="1"/>
+            </p:cNvSpPr>
+            <p:nvPr/>
+          </p:nvSpPr>
+          <p:spPr bwMode="gray">
+            <a:xfrm>
+              <a:off x="3264" y="2737"/>
+              <a:ext cx="1349" cy="1167"/>
+            </a:xfrm>
+            <a:prstGeom prst="hexagon">
+              <a:avLst>
+                <a:gd name="adj" fmla="val 28896"/>
+                <a:gd name="vf" fmla="val 115470"/>
+              </a:avLst>
+            </a:prstGeom>
+            <a:gradFill rotWithShape="1">
+              <a:gsLst>
+                <a:gs pos="0">
+                  <a:schemeClr val="accent1">
+                    <a:gamma/>
+                    <a:shade val="46275"/>
+                    <a:invGamma/>
+                  </a:schemeClr>
+                </a:gs>
+                <a:gs pos="100000">
+                  <a:schemeClr val="accent1"/>
+                </a:gs>
+              </a:gsLst>
+              <a:lin ang="2700000" scaled="1"/>
+            </a:gradFill>
+            <a:ln w="9525">
+              <a:solidFill>
+                <a:schemeClr val="tx1"/>
+              </a:solidFill>
+              <a:miter lim="800000"/>
+              <a:headEnd/>
+              <a:tailEnd/>
+            </a:ln>
+            <a:effectLst/>
+          </p:spPr>
+          <p:txBody>
+            <a:bodyPr wrap="none" anchor="ctr"/>
+            <a:lstStyle/>
+            <a:p>
+              <a:pPr>
+                <a:defRPr/>
+              </a:pPr>
+              <a:endParaRPr lang="en-US" dirty="0"/>
+            </a:p>
+          </p:txBody>
+        </p:sp>
+      </p:grpSp>
+      <p:sp>
+        <p:nvSpPr>
+          <p:cNvPr id="4109" name="Line 25"/>
+          <p:cNvSpPr>
+            <a:spLocks noChangeShapeType="1"/>
+          </p:cNvSpPr>
+          <p:nvPr/>
+        </p:nvSpPr>
+        <p:spPr bwMode="auto">
+          <a:xfrm>
+            <a:off x="2438400" y="4168775"/>
+            <a:ext cx="4800600" cy="0"/>
+          </a:xfrm>
+          <a:prstGeom prst="line">
+            <a:avLst/>
+          </a:prstGeom>
+          <a:noFill/>
+          <a:ln w="25400">
+            <a:solidFill>
+              <a:srgbClr val="C0C0C0"/>
+            </a:solidFill>
+            <a:prstDash val="sysDot"/>
+            <a:round/>
+            <a:headEnd/>
+            <a:tailEnd type="oval" w="med" len="med"/>
+          </a:ln>
+        </p:spPr>
+        <p:txBody>
+          <a:bodyPr wrap="none" anchor="ctr"/>
+          <a:lstStyle/>
+          <a:p>
+            <a:endParaRPr lang="en-US" dirty="0"/>
+          </a:p>
+        </p:txBody>
+      </p:sp>
+      <p:sp>
+        <p:nvSpPr>
+          <p:cNvPr id="4110" name="Text Box 26"/>
+          <p:cNvSpPr txBox="1">
+            <a:spLocks noChangeArrowheads="1"/>
+          </p:cNvSpPr>
+          <p:nvPr/>
+        </p:nvSpPr>
+        <p:spPr bwMode="auto">
+          <a:xfrm>
+            <a:off x="3276600" y="3635375"/>
+            <a:ext cx="1058303" cy="461665"/>
+          </a:xfrm>
+          <a:prstGeom prst="rect">
+            <a:avLst/>
+          </a:prstGeom>
+          <a:noFill/>
+          <a:ln w="9525" algn="ctr">
+            <a:noFill/>
+            <a:miter lim="800000"/>
+            <a:headEnd/>
+            <a:tailEnd/>
+          </a:ln>
+        </p:spPr>
+        <p:txBody>
+          <a:bodyPr wrap="none">
+            <a:spAutoFit/>
+          </a:bodyPr>
+          <a:lstStyle/>
+          <a:p>
+            <a:pPr eaLnBrk="0" hangingPunct="0"/>
+            <a:r>
+              <a:rPr lang="en-US" sz="2400" dirty="0" smtClean="0"/>
+              <a:t>Scope</a:t>
+            </a:r>
+            <a:endParaRPr lang="en-US" sz="2400" dirty="0"/>
+          </a:p>
+        </p:txBody>
+      </p:sp>
+      <p:sp>
+        <p:nvSpPr>
+          <p:cNvPr id="4111" name="Text Box 27"/>
+          <p:cNvSpPr txBox="1">
+            <a:spLocks noChangeArrowheads="1"/>
+          </p:cNvSpPr>
+          <p:nvPr/>
+        </p:nvSpPr>
+        <p:spPr bwMode="gray">
+          <a:xfrm>
+            <a:off x="2025650" y="3657600"/>
+            <a:ext cx="354013" cy="457200"/>
+          </a:xfrm>
+          <a:prstGeom prst="rect">
+            <a:avLst/>
+          </a:prstGeom>
+          <a:noFill/>
+          <a:ln w="9525" algn="ctr">
+            <a:noFill/>
+            <a:miter lim="800000"/>
+            <a:headEnd/>
+            <a:tailEnd/>
+          </a:ln>
+        </p:spPr>
+        <p:txBody>
+          <a:bodyPr wrap="none">
+            <a:spAutoFit/>
+          </a:bodyPr>
+          <a:lstStyle/>
+          <a:p>
+            <a:pPr algn="ctr" eaLnBrk="0" hangingPunct="0"/>
+            <a:r>
+              <a:rPr lang="en-US" sz="2400" b="1" dirty="0">
+                <a:solidFill>
+                  <a:schemeClr val="bg1"/>
+                </a:solidFill>
+              </a:rPr>
+              <a:t>3</a:t>
+            </a:r>
+          </a:p>
+        </p:txBody>
+      </p:sp>
+      <p:sp>
+        <p:nvSpPr>
+          <p:cNvPr id="4112" name="Line 28"/>
+          <p:cNvSpPr>
+            <a:spLocks noChangeShapeType="1"/>
+          </p:cNvSpPr>
+          <p:nvPr/>
+        </p:nvSpPr>
+        <p:spPr bwMode="auto">
+          <a:xfrm>
+            <a:off x="2438400" y="5083175"/>
+            <a:ext cx="4800600" cy="0"/>
+          </a:xfrm>
+          <a:prstGeom prst="line">
+            <a:avLst/>
+          </a:prstGeom>
+          <a:noFill/>
+          <a:ln w="25400">
+            <a:solidFill>
+              <a:srgbClr val="C0C0C0"/>
+            </a:solidFill>
+            <a:prstDash val="sysDot"/>
+            <a:round/>
+            <a:headEnd/>
+            <a:tailEnd type="oval" w="med" len="med"/>
+          </a:ln>
+        </p:spPr>
+        <p:txBody>
+          <a:bodyPr wrap="none" anchor="ctr"/>
+          <a:lstStyle/>
+          <a:p>
+            <a:endParaRPr lang="en-US" dirty="0"/>
+          </a:p>
+        </p:txBody>
+      </p:sp>
+      <p:sp>
+        <p:nvSpPr>
+          <p:cNvPr id="4113" name="Text Box 29"/>
+          <p:cNvSpPr txBox="1">
+            <a:spLocks noChangeArrowheads="1"/>
+          </p:cNvSpPr>
+          <p:nvPr/>
+        </p:nvSpPr>
+        <p:spPr bwMode="auto">
+          <a:xfrm>
+            <a:off x="3276600" y="4549775"/>
+            <a:ext cx="973343" cy="461665"/>
+          </a:xfrm>
+          <a:prstGeom prst="rect">
+            <a:avLst/>
+          </a:prstGeom>
+          <a:noFill/>
+          <a:ln w="9525" algn="ctr">
+            <a:noFill/>
+            <a:miter lim="800000"/>
+            <a:headEnd/>
+            <a:tailEnd/>
+          </a:ln>
+        </p:spPr>
+        <p:txBody>
+          <a:bodyPr wrap="none">
+            <a:spAutoFit/>
+          </a:bodyPr>
+          <a:lstStyle/>
+          <a:p>
+            <a:pPr eaLnBrk="0" hangingPunct="0"/>
+            <a:r>
+              <a:rPr lang="en-US" sz="2400" dirty="0" smtClean="0"/>
+              <a:t>Detail</a:t>
+            </a:r>
+            <a:endParaRPr lang="en-US" sz="2400" dirty="0"/>
+          </a:p>
+        </p:txBody>
+      </p:sp>
+      <p:sp>
+        <p:nvSpPr>
+          <p:cNvPr id="4114" name="Text Box 30"/>
+          <p:cNvSpPr txBox="1">
+            <a:spLocks noChangeArrowheads="1"/>
+          </p:cNvSpPr>
+          <p:nvPr/>
+        </p:nvSpPr>
+        <p:spPr bwMode="gray">
+          <a:xfrm>
+            <a:off x="2025650" y="4572000"/>
+            <a:ext cx="354013" cy="457200"/>
+          </a:xfrm>
+          <a:prstGeom prst="rect">
+            <a:avLst/>
+          </a:prstGeom>
+          <a:noFill/>
+          <a:ln w="9525" algn="ctr">
+            <a:noFill/>
+            <a:miter lim="800000"/>
+            <a:headEnd/>
+            <a:tailEnd/>
+          </a:ln>
+        </p:spPr>
+        <p:txBody>
+          <a:bodyPr wrap="none">
+            <a:spAutoFit/>
+          </a:bodyPr>
+          <a:lstStyle/>
+          <a:p>
+            <a:pPr algn="ctr" eaLnBrk="0" hangingPunct="0"/>
+            <a:r>
+              <a:rPr lang="en-US" sz="2400" b="1" dirty="0">
+                <a:solidFill>
+                  <a:schemeClr val="bg1"/>
+                </a:solidFill>
+              </a:rPr>
+              <a:t>4</a:t>
+            </a:r>
+          </a:p>
+        </p:txBody>
+      </p:sp>
+      <p:sp>
+        <p:nvSpPr>
+          <p:cNvPr id="4115" name="Slide Number Placeholder 32"/>
+          <p:cNvSpPr>
+            <a:spLocks noGrp="1"/>
+          </p:cNvSpPr>
+          <p:nvPr>
+            <p:ph type="sldNum" sz="quarter" idx="12"/>
+          </p:nvPr>
+        </p:nvSpPr>
+        <p:spPr>
+          <a:noFill/>
+        </p:spPr>
+        <p:txBody>
+          <a:bodyPr/>
+          <a:lstStyle/>
+          <a:p>
+            <a:fld id="{8E64E13D-8F49-4D86-B09B-1E00BF74E486}" type="slidenum">
+              <a:rPr lang="en-US" smtClean="0"/>
+              <a:pPr/>
+              <a:t>2</a:t>
+            </a:fld>
+            <a:endParaRPr lang="en-US" dirty="0" smtClean="0"/>
+          </a:p>
+        </p:txBody>
+      </p:sp>
+      <p:pic>
+        <p:nvPicPr>
+          <p:cNvPr id="33" name="Picture 32" descr="logo_final.png"/>
+          <p:cNvPicPr>
+            <a:picLocks noChangeAspect="1"/>
+          </p:cNvPicPr>
+          <p:nvPr/>
+        </p:nvPicPr>
+        <p:blipFill>
+          <a:blip r:embed="rId2" cstate="print"/>
+          <a:stretch>
+            <a:fillRect/>
+          </a:stretch>
+        </p:blipFill>
+        <p:spPr>
+          <a:xfrm>
+            <a:off x="8001000" y="0"/>
+            <a:ext cx="1219200" cy="1219200"/>
+          </a:xfrm>
+          <a:prstGeom prst="rect">
+            <a:avLst/>
+          </a:prstGeom>
+        </p:spPr>
+      </p:pic>
+    </p:spTree>
+  </p:cSld>
+  <p:clrMapOvr>
+    <a:masterClrMapping/>
+  </p:clrMapOvr>
+  <p:timing>
+    <p:tnLst>
+      <p:par>
+        <p:cTn id="1" dur="indefinite" restart="never" nodeType="tmRoot"/>
+      </p:par>
+    </p:tnLst>
+  </p:timing>
+</p:sld>
+</file>
+
+<file path=ppt/slides/slide20.xml><?xml version="1.0" encoding="utf-8"?>
 <p:sld xmlns:a="http://schemas.openxmlformats.org/drawingml/2006/main" xmlns:r="http://schemas.openxmlformats.org/officeDocument/2006/relationships" xmlns:p="http://schemas.openxmlformats.org/presentationml/2006/main">
   <p:cSld>
     <p:spTree>
@@ -12946,7 +14470,7 @@
               <a:pPr>
                 <a:defRPr/>
               </a:pPr>
-              <a:t>19</a:t>
+              <a:t>20</a:t>
             </a:fld>
             <a:endParaRPr lang="en-US" dirty="0"/>
           </a:p>
@@ -14124,1313 +15648,7 @@
 </p:sld>
 </file>
 
-<file path=ppt/slides/slide2.xml><?xml version="1.0" encoding="utf-8"?>
-<p:sld xmlns:a="http://schemas.openxmlformats.org/drawingml/2006/main" xmlns:r="http://schemas.openxmlformats.org/officeDocument/2006/relationships" xmlns:p="http://schemas.openxmlformats.org/presentationml/2006/main">
-  <p:cSld>
-    <p:spTree>
-      <p:nvGrpSpPr>
-        <p:cNvPr id="1" name=""/>
-        <p:cNvGrpSpPr/>
-        <p:nvPr/>
-      </p:nvGrpSpPr>
-      <p:grpSpPr>
-        <a:xfrm>
-          <a:off x="0" y="0"/>
-          <a:ext cx="0" cy="0"/>
-          <a:chOff x="0" y="0"/>
-          <a:chExt cx="0" cy="0"/>
-        </a:xfrm>
-      </p:grpSpPr>
-      <p:sp>
-        <p:nvSpPr>
-          <p:cNvPr id="4098" name="Rectangle 2"/>
-          <p:cNvSpPr>
-            <a:spLocks noGrp="1" noChangeArrowheads="1"/>
-          </p:cNvSpPr>
-          <p:nvPr>
-            <p:ph type="title"/>
-          </p:nvPr>
-        </p:nvSpPr>
-        <p:spPr/>
-        <p:txBody>
-          <a:bodyPr/>
-          <a:lstStyle/>
-          <a:p>
-            <a:pPr algn="l" eaLnBrk="1" hangingPunct="1"/>
-            <a:r>
-              <a:rPr lang="en-US" sz="4000" dirty="0" smtClean="0"/>
-              <a:t>Contents</a:t>
-            </a:r>
-            <a:endParaRPr lang="en-US" sz="2400" dirty="0" smtClean="0">
-              <a:solidFill>
-                <a:schemeClr val="accent1"/>
-              </a:solidFill>
-            </a:endParaRPr>
-          </a:p>
-        </p:txBody>
-      </p:sp>
-      <p:grpSp>
-        <p:nvGrpSpPr>
-          <p:cNvPr id="4099" name="Group 3"/>
-          <p:cNvGrpSpPr>
-            <a:grpSpLocks/>
-          </p:cNvGrpSpPr>
-          <p:nvPr/>
-        </p:nvGrpSpPr>
-        <p:grpSpPr bwMode="auto">
-          <a:xfrm>
-            <a:off x="1828800" y="1752600"/>
-            <a:ext cx="762000" cy="665163"/>
-            <a:chOff x="1110" y="2656"/>
-            <a:chExt cx="1549" cy="1351"/>
-          </a:xfrm>
-        </p:grpSpPr>
-        <p:sp>
-          <p:nvSpPr>
-            <p:cNvPr id="4132" name="AutoShape 4"/>
-            <p:cNvSpPr>
-              <a:spLocks noChangeArrowheads="1"/>
-            </p:cNvSpPr>
-            <p:nvPr/>
-          </p:nvSpPr>
-          <p:spPr bwMode="gray">
-            <a:xfrm>
-              <a:off x="1123" y="2679"/>
-              <a:ext cx="1536" cy="1328"/>
-            </a:xfrm>
-            <a:prstGeom prst="hexagon">
-              <a:avLst>
-                <a:gd name="adj" fmla="val 28916"/>
-                <a:gd name="vf" fmla="val 115470"/>
-              </a:avLst>
-            </a:prstGeom>
-            <a:solidFill>
-              <a:srgbClr val="808080"/>
-            </a:solidFill>
-            <a:ln w="9525">
-              <a:noFill/>
-              <a:miter lim="800000"/>
-              <a:headEnd/>
-              <a:tailEnd/>
-            </a:ln>
-          </p:spPr>
-          <p:txBody>
-            <a:bodyPr wrap="none" anchor="ctr"/>
-            <a:lstStyle/>
-            <a:p>
-              <a:endParaRPr lang="en-US" dirty="0"/>
-            </a:p>
-          </p:txBody>
-        </p:sp>
-        <p:sp>
-          <p:nvSpPr>
-            <p:cNvPr id="4133" name="AutoShape 5"/>
-            <p:cNvSpPr>
-              <a:spLocks noChangeArrowheads="1"/>
-            </p:cNvSpPr>
-            <p:nvPr/>
-          </p:nvSpPr>
-          <p:spPr bwMode="gray">
-            <a:xfrm>
-              <a:off x="1110" y="2656"/>
-              <a:ext cx="1536" cy="1328"/>
-            </a:xfrm>
-            <a:prstGeom prst="hexagon">
-              <a:avLst>
-                <a:gd name="adj" fmla="val 28916"/>
-                <a:gd name="vf" fmla="val 115470"/>
-              </a:avLst>
-            </a:prstGeom>
-            <a:gradFill rotWithShape="1">
-              <a:gsLst>
-                <a:gs pos="0">
-                  <a:srgbClr val="E6E6E6"/>
-                </a:gs>
-                <a:gs pos="7500">
-                  <a:srgbClr val="7D8496"/>
-                </a:gs>
-                <a:gs pos="26500">
-                  <a:srgbClr val="E6E6E6"/>
-                </a:gs>
-                <a:gs pos="34000">
-                  <a:srgbClr val="7D8496"/>
-                </a:gs>
-                <a:gs pos="46500">
-                  <a:srgbClr val="E6E6E6"/>
-                </a:gs>
-                <a:gs pos="50000">
-                  <a:srgbClr val="FFFFFF"/>
-                </a:gs>
-                <a:gs pos="53500">
-                  <a:srgbClr val="E6E6E6"/>
-                </a:gs>
-                <a:gs pos="66000">
-                  <a:srgbClr val="7D8496"/>
-                </a:gs>
-                <a:gs pos="73500">
-                  <a:srgbClr val="E6E6E6"/>
-                </a:gs>
-                <a:gs pos="92500">
-                  <a:srgbClr val="7D8496"/>
-                </a:gs>
-                <a:gs pos="100000">
-                  <a:srgbClr val="E6E6E6"/>
-                </a:gs>
-              </a:gsLst>
-              <a:lin ang="2700000" scaled="1"/>
-            </a:gradFill>
-            <a:ln w="9525">
-              <a:solidFill>
-                <a:srgbClr val="C0C0C0"/>
-              </a:solidFill>
-              <a:miter lim="800000"/>
-              <a:headEnd/>
-              <a:tailEnd/>
-            </a:ln>
-          </p:spPr>
-          <p:txBody>
-            <a:bodyPr wrap="none" anchor="ctr"/>
-            <a:lstStyle/>
-            <a:p>
-              <a:endParaRPr lang="en-US" dirty="0"/>
-            </a:p>
-          </p:txBody>
-        </p:sp>
-        <p:sp>
-          <p:nvSpPr>
-            <p:cNvPr id="40966" name="AutoShape 6"/>
-            <p:cNvSpPr>
-              <a:spLocks noChangeArrowheads="1"/>
-            </p:cNvSpPr>
-            <p:nvPr/>
-          </p:nvSpPr>
-          <p:spPr bwMode="gray">
-            <a:xfrm>
-              <a:off x="1200" y="2737"/>
-              <a:ext cx="1349" cy="1167"/>
-            </a:xfrm>
-            <a:prstGeom prst="hexagon">
-              <a:avLst>
-                <a:gd name="adj" fmla="val 28896"/>
-                <a:gd name="vf" fmla="val 115470"/>
-              </a:avLst>
-            </a:prstGeom>
-            <a:gradFill rotWithShape="1">
-              <a:gsLst>
-                <a:gs pos="0">
-                  <a:schemeClr val="hlink">
-                    <a:gamma/>
-                    <a:shade val="46275"/>
-                    <a:invGamma/>
-                  </a:schemeClr>
-                </a:gs>
-                <a:gs pos="100000">
-                  <a:schemeClr val="hlink"/>
-                </a:gs>
-              </a:gsLst>
-              <a:lin ang="2700000" scaled="1"/>
-            </a:gradFill>
-            <a:ln w="9525">
-              <a:solidFill>
-                <a:schemeClr val="tx1"/>
-              </a:solidFill>
-              <a:miter lim="800000"/>
-              <a:headEnd/>
-              <a:tailEnd/>
-            </a:ln>
-            <a:effectLst/>
-          </p:spPr>
-          <p:txBody>
-            <a:bodyPr wrap="none" anchor="ctr"/>
-            <a:lstStyle/>
-            <a:p>
-              <a:pPr>
-                <a:defRPr/>
-              </a:pPr>
-              <a:endParaRPr lang="en-US" dirty="0"/>
-            </a:p>
-          </p:txBody>
-        </p:sp>
-      </p:grpSp>
-      <p:grpSp>
-        <p:nvGrpSpPr>
-          <p:cNvPr id="4100" name="Group 7"/>
-          <p:cNvGrpSpPr>
-            <a:grpSpLocks/>
-          </p:cNvGrpSpPr>
-          <p:nvPr/>
-        </p:nvGrpSpPr>
-        <p:grpSpPr bwMode="auto">
-          <a:xfrm>
-            <a:off x="1828800" y="2667000"/>
-            <a:ext cx="762000" cy="665163"/>
-            <a:chOff x="3174" y="2656"/>
-            <a:chExt cx="1549" cy="1351"/>
-          </a:xfrm>
-        </p:grpSpPr>
-        <p:sp>
-          <p:nvSpPr>
-            <p:cNvPr id="4129" name="AutoShape 8"/>
-            <p:cNvSpPr>
-              <a:spLocks noChangeArrowheads="1"/>
-            </p:cNvSpPr>
-            <p:nvPr/>
-          </p:nvSpPr>
-          <p:spPr bwMode="gray">
-            <a:xfrm>
-              <a:off x="3187" y="2679"/>
-              <a:ext cx="1536" cy="1328"/>
-            </a:xfrm>
-            <a:prstGeom prst="hexagon">
-              <a:avLst>
-                <a:gd name="adj" fmla="val 28916"/>
-                <a:gd name="vf" fmla="val 115470"/>
-              </a:avLst>
-            </a:prstGeom>
-            <a:solidFill>
-              <a:srgbClr val="808080"/>
-            </a:solidFill>
-            <a:ln w="9525">
-              <a:noFill/>
-              <a:miter lim="800000"/>
-              <a:headEnd/>
-              <a:tailEnd/>
-            </a:ln>
-          </p:spPr>
-          <p:txBody>
-            <a:bodyPr wrap="none" anchor="ctr"/>
-            <a:lstStyle/>
-            <a:p>
-              <a:endParaRPr lang="en-US" dirty="0"/>
-            </a:p>
-          </p:txBody>
-        </p:sp>
-        <p:sp>
-          <p:nvSpPr>
-            <p:cNvPr id="4130" name="AutoShape 9"/>
-            <p:cNvSpPr>
-              <a:spLocks noChangeArrowheads="1"/>
-            </p:cNvSpPr>
-            <p:nvPr/>
-          </p:nvSpPr>
-          <p:spPr bwMode="gray">
-            <a:xfrm>
-              <a:off x="3174" y="2656"/>
-              <a:ext cx="1536" cy="1328"/>
-            </a:xfrm>
-            <a:prstGeom prst="hexagon">
-              <a:avLst>
-                <a:gd name="adj" fmla="val 28916"/>
-                <a:gd name="vf" fmla="val 115470"/>
-              </a:avLst>
-            </a:prstGeom>
-            <a:gradFill rotWithShape="1">
-              <a:gsLst>
-                <a:gs pos="0">
-                  <a:srgbClr val="E6E6E6"/>
-                </a:gs>
-                <a:gs pos="7500">
-                  <a:srgbClr val="7D8496"/>
-                </a:gs>
-                <a:gs pos="26500">
-                  <a:srgbClr val="E6E6E6"/>
-                </a:gs>
-                <a:gs pos="34000">
-                  <a:srgbClr val="7D8496"/>
-                </a:gs>
-                <a:gs pos="46500">
-                  <a:srgbClr val="E6E6E6"/>
-                </a:gs>
-                <a:gs pos="50000">
-                  <a:srgbClr val="FFFFFF"/>
-                </a:gs>
-                <a:gs pos="53500">
-                  <a:srgbClr val="E6E6E6"/>
-                </a:gs>
-                <a:gs pos="66000">
-                  <a:srgbClr val="7D8496"/>
-                </a:gs>
-                <a:gs pos="73500">
-                  <a:srgbClr val="E6E6E6"/>
-                </a:gs>
-                <a:gs pos="92500">
-                  <a:srgbClr val="7D8496"/>
-                </a:gs>
-                <a:gs pos="100000">
-                  <a:srgbClr val="E6E6E6"/>
-                </a:gs>
-              </a:gsLst>
-              <a:lin ang="2700000" scaled="1"/>
-            </a:gradFill>
-            <a:ln w="9525">
-              <a:solidFill>
-                <a:srgbClr val="C0C0C0"/>
-              </a:solidFill>
-              <a:miter lim="800000"/>
-              <a:headEnd/>
-              <a:tailEnd/>
-            </a:ln>
-          </p:spPr>
-          <p:txBody>
-            <a:bodyPr wrap="none" anchor="ctr"/>
-            <a:lstStyle/>
-            <a:p>
-              <a:endParaRPr lang="en-US" dirty="0"/>
-            </a:p>
-          </p:txBody>
-        </p:sp>
-        <p:sp>
-          <p:nvSpPr>
-            <p:cNvPr id="40970" name="AutoShape 10"/>
-            <p:cNvSpPr>
-              <a:spLocks noChangeArrowheads="1"/>
-            </p:cNvSpPr>
-            <p:nvPr/>
-          </p:nvSpPr>
-          <p:spPr bwMode="gray">
-            <a:xfrm>
-              <a:off x="3264" y="2737"/>
-              <a:ext cx="1349" cy="1167"/>
-            </a:xfrm>
-            <a:prstGeom prst="hexagon">
-              <a:avLst>
-                <a:gd name="adj" fmla="val 28896"/>
-                <a:gd name="vf" fmla="val 115470"/>
-              </a:avLst>
-            </a:prstGeom>
-            <a:gradFill rotWithShape="1">
-              <a:gsLst>
-                <a:gs pos="0">
-                  <a:schemeClr val="accent1">
-                    <a:gamma/>
-                    <a:shade val="46275"/>
-                    <a:invGamma/>
-                  </a:schemeClr>
-                </a:gs>
-                <a:gs pos="100000">
-                  <a:schemeClr val="accent1"/>
-                </a:gs>
-              </a:gsLst>
-              <a:lin ang="2700000" scaled="1"/>
-            </a:gradFill>
-            <a:ln w="9525">
-              <a:solidFill>
-                <a:schemeClr val="tx1"/>
-              </a:solidFill>
-              <a:miter lim="800000"/>
-              <a:headEnd/>
-              <a:tailEnd/>
-            </a:ln>
-            <a:effectLst/>
-          </p:spPr>
-          <p:txBody>
-            <a:bodyPr wrap="none" anchor="ctr"/>
-            <a:lstStyle/>
-            <a:p>
-              <a:pPr>
-                <a:defRPr/>
-              </a:pPr>
-              <a:endParaRPr lang="en-US" dirty="0"/>
-            </a:p>
-          </p:txBody>
-        </p:sp>
-      </p:grpSp>
-      <p:sp>
-        <p:nvSpPr>
-          <p:cNvPr id="4101" name="Line 11"/>
-          <p:cNvSpPr>
-            <a:spLocks noChangeShapeType="1"/>
-          </p:cNvSpPr>
-          <p:nvPr/>
-        </p:nvSpPr>
-        <p:spPr bwMode="auto">
-          <a:xfrm>
-            <a:off x="2438400" y="2362200"/>
-            <a:ext cx="4800600" cy="0"/>
-          </a:xfrm>
-          <a:prstGeom prst="line">
-            <a:avLst/>
-          </a:prstGeom>
-          <a:noFill/>
-          <a:ln w="25400">
-            <a:solidFill>
-              <a:srgbClr val="C0C0C0"/>
-            </a:solidFill>
-            <a:prstDash val="sysDot"/>
-            <a:round/>
-            <a:headEnd/>
-            <a:tailEnd type="oval" w="med" len="med"/>
-          </a:ln>
-        </p:spPr>
-        <p:txBody>
-          <a:bodyPr wrap="none" anchor="ctr"/>
-          <a:lstStyle/>
-          <a:p>
-            <a:endParaRPr lang="en-US" dirty="0"/>
-          </a:p>
-        </p:txBody>
-      </p:sp>
-      <p:sp>
-        <p:nvSpPr>
-          <p:cNvPr id="4102" name="Text Box 12"/>
-          <p:cNvSpPr txBox="1">
-            <a:spLocks noChangeArrowheads="1"/>
-          </p:cNvSpPr>
-          <p:nvPr/>
-        </p:nvSpPr>
-        <p:spPr bwMode="auto">
-          <a:xfrm>
-            <a:off x="3276600" y="1828800"/>
-            <a:ext cx="784189" cy="461665"/>
-          </a:xfrm>
-          <a:prstGeom prst="rect">
-            <a:avLst/>
-          </a:prstGeom>
-          <a:noFill/>
-          <a:ln w="9525" algn="ctr">
-            <a:noFill/>
-            <a:miter lim="800000"/>
-            <a:headEnd/>
-            <a:tailEnd/>
-          </a:ln>
-        </p:spPr>
-        <p:txBody>
-          <a:bodyPr wrap="none">
-            <a:spAutoFit/>
-          </a:bodyPr>
-          <a:lstStyle/>
-          <a:p>
-            <a:pPr eaLnBrk="0" hangingPunct="0"/>
-            <a:r>
-              <a:rPr lang="en-US" sz="2400" dirty="0" smtClean="0"/>
-              <a:t>Idea</a:t>
-            </a:r>
-            <a:endParaRPr lang="en-US" sz="2400" dirty="0"/>
-          </a:p>
-        </p:txBody>
-      </p:sp>
-      <p:sp>
-        <p:nvSpPr>
-          <p:cNvPr id="4103" name="Text Box 13"/>
-          <p:cNvSpPr txBox="1">
-            <a:spLocks noChangeArrowheads="1"/>
-          </p:cNvSpPr>
-          <p:nvPr/>
-        </p:nvSpPr>
-        <p:spPr bwMode="gray">
-          <a:xfrm>
-            <a:off x="2025650" y="1851025"/>
-            <a:ext cx="354013" cy="457200"/>
-          </a:xfrm>
-          <a:prstGeom prst="rect">
-            <a:avLst/>
-          </a:prstGeom>
-          <a:noFill/>
-          <a:ln w="9525" algn="ctr">
-            <a:noFill/>
-            <a:miter lim="800000"/>
-            <a:headEnd/>
-            <a:tailEnd/>
-          </a:ln>
-        </p:spPr>
-        <p:txBody>
-          <a:bodyPr wrap="none">
-            <a:spAutoFit/>
-          </a:bodyPr>
-          <a:lstStyle/>
-          <a:p>
-            <a:pPr algn="ctr" eaLnBrk="0" hangingPunct="0"/>
-            <a:r>
-              <a:rPr lang="en-US" sz="2400" b="1" dirty="0">
-                <a:solidFill>
-                  <a:schemeClr val="bg1"/>
-                </a:solidFill>
-              </a:rPr>
-              <a:t>1</a:t>
-            </a:r>
-          </a:p>
-        </p:txBody>
-      </p:sp>
-      <p:sp>
-        <p:nvSpPr>
-          <p:cNvPr id="4104" name="Line 14"/>
-          <p:cNvSpPr>
-            <a:spLocks noChangeShapeType="1"/>
-          </p:cNvSpPr>
-          <p:nvPr/>
-        </p:nvSpPr>
-        <p:spPr bwMode="auto">
-          <a:xfrm>
-            <a:off x="2438400" y="3276600"/>
-            <a:ext cx="4800600" cy="0"/>
-          </a:xfrm>
-          <a:prstGeom prst="line">
-            <a:avLst/>
-          </a:prstGeom>
-          <a:noFill/>
-          <a:ln w="25400">
-            <a:solidFill>
-              <a:srgbClr val="C0C0C0"/>
-            </a:solidFill>
-            <a:prstDash val="sysDot"/>
-            <a:round/>
-            <a:headEnd/>
-            <a:tailEnd type="oval" w="med" len="med"/>
-          </a:ln>
-        </p:spPr>
-        <p:txBody>
-          <a:bodyPr wrap="none" anchor="ctr"/>
-          <a:lstStyle/>
-          <a:p>
-            <a:endParaRPr lang="en-US" dirty="0"/>
-          </a:p>
-        </p:txBody>
-      </p:sp>
-      <p:sp>
-        <p:nvSpPr>
-          <p:cNvPr id="4105" name="Text Box 15"/>
-          <p:cNvSpPr txBox="1">
-            <a:spLocks noChangeArrowheads="1"/>
-          </p:cNvSpPr>
-          <p:nvPr/>
-        </p:nvSpPr>
-        <p:spPr bwMode="auto">
-          <a:xfrm>
-            <a:off x="3276600" y="2743200"/>
-            <a:ext cx="1468672" cy="461665"/>
-          </a:xfrm>
-          <a:prstGeom prst="rect">
-            <a:avLst/>
-          </a:prstGeom>
-          <a:noFill/>
-          <a:ln w="9525" algn="ctr">
-            <a:noFill/>
-            <a:miter lim="800000"/>
-            <a:headEnd/>
-            <a:tailEnd/>
-          </a:ln>
-        </p:spPr>
-        <p:txBody>
-          <a:bodyPr wrap="none">
-            <a:spAutoFit/>
-          </a:bodyPr>
-          <a:lstStyle/>
-          <a:p>
-            <a:pPr eaLnBrk="0" hangingPunct="0"/>
-            <a:r>
-              <a:rPr lang="en-US" sz="2400" dirty="0" smtClean="0"/>
-              <a:t>Overview</a:t>
-            </a:r>
-            <a:endParaRPr lang="en-US" sz="2400" dirty="0"/>
-          </a:p>
-        </p:txBody>
-      </p:sp>
-      <p:sp>
-        <p:nvSpPr>
-          <p:cNvPr id="4106" name="Text Box 16"/>
-          <p:cNvSpPr txBox="1">
-            <a:spLocks noChangeArrowheads="1"/>
-          </p:cNvSpPr>
-          <p:nvPr/>
-        </p:nvSpPr>
-        <p:spPr bwMode="gray">
-          <a:xfrm>
-            <a:off x="2025650" y="2765425"/>
-            <a:ext cx="354013" cy="457200"/>
-          </a:xfrm>
-          <a:prstGeom prst="rect">
-            <a:avLst/>
-          </a:prstGeom>
-          <a:noFill/>
-          <a:ln w="9525" algn="ctr">
-            <a:noFill/>
-            <a:miter lim="800000"/>
-            <a:headEnd/>
-            <a:tailEnd/>
-          </a:ln>
-        </p:spPr>
-        <p:txBody>
-          <a:bodyPr wrap="none">
-            <a:spAutoFit/>
-          </a:bodyPr>
-          <a:lstStyle/>
-          <a:p>
-            <a:pPr algn="ctr" eaLnBrk="0" hangingPunct="0"/>
-            <a:r>
-              <a:rPr lang="en-US" sz="2400" b="1" dirty="0">
-                <a:solidFill>
-                  <a:schemeClr val="bg1"/>
-                </a:solidFill>
-              </a:rPr>
-              <a:t>2</a:t>
-            </a:r>
-          </a:p>
-        </p:txBody>
-      </p:sp>
-      <p:grpSp>
-        <p:nvGrpSpPr>
-          <p:cNvPr id="4107" name="Group 17"/>
-          <p:cNvGrpSpPr>
-            <a:grpSpLocks/>
-          </p:cNvGrpSpPr>
-          <p:nvPr/>
-        </p:nvGrpSpPr>
-        <p:grpSpPr bwMode="auto">
-          <a:xfrm>
-            <a:off x="1828800" y="3559175"/>
-            <a:ext cx="762000" cy="665163"/>
-            <a:chOff x="1110" y="2656"/>
-            <a:chExt cx="1549" cy="1351"/>
-          </a:xfrm>
-        </p:grpSpPr>
-        <p:sp>
-          <p:nvSpPr>
-            <p:cNvPr id="4126" name="AutoShape 18"/>
-            <p:cNvSpPr>
-              <a:spLocks noChangeArrowheads="1"/>
-            </p:cNvSpPr>
-            <p:nvPr/>
-          </p:nvSpPr>
-          <p:spPr bwMode="gray">
-            <a:xfrm>
-              <a:off x="1123" y="2679"/>
-              <a:ext cx="1536" cy="1328"/>
-            </a:xfrm>
-            <a:prstGeom prst="hexagon">
-              <a:avLst>
-                <a:gd name="adj" fmla="val 28916"/>
-                <a:gd name="vf" fmla="val 115470"/>
-              </a:avLst>
-            </a:prstGeom>
-            <a:solidFill>
-              <a:srgbClr val="808080"/>
-            </a:solidFill>
-            <a:ln w="9525">
-              <a:noFill/>
-              <a:miter lim="800000"/>
-              <a:headEnd/>
-              <a:tailEnd/>
-            </a:ln>
-          </p:spPr>
-          <p:txBody>
-            <a:bodyPr wrap="none" anchor="ctr"/>
-            <a:lstStyle/>
-            <a:p>
-              <a:endParaRPr lang="en-US" dirty="0"/>
-            </a:p>
-          </p:txBody>
-        </p:sp>
-        <p:sp>
-          <p:nvSpPr>
-            <p:cNvPr id="4127" name="AutoShape 19"/>
-            <p:cNvSpPr>
-              <a:spLocks noChangeArrowheads="1"/>
-            </p:cNvSpPr>
-            <p:nvPr/>
-          </p:nvSpPr>
-          <p:spPr bwMode="gray">
-            <a:xfrm>
-              <a:off x="1110" y="2656"/>
-              <a:ext cx="1536" cy="1328"/>
-            </a:xfrm>
-            <a:prstGeom prst="hexagon">
-              <a:avLst>
-                <a:gd name="adj" fmla="val 28916"/>
-                <a:gd name="vf" fmla="val 115470"/>
-              </a:avLst>
-            </a:prstGeom>
-            <a:gradFill rotWithShape="1">
-              <a:gsLst>
-                <a:gs pos="0">
-                  <a:srgbClr val="E6E6E6"/>
-                </a:gs>
-                <a:gs pos="7500">
-                  <a:srgbClr val="7D8496"/>
-                </a:gs>
-                <a:gs pos="26500">
-                  <a:srgbClr val="E6E6E6"/>
-                </a:gs>
-                <a:gs pos="34000">
-                  <a:srgbClr val="7D8496"/>
-                </a:gs>
-                <a:gs pos="46500">
-                  <a:srgbClr val="E6E6E6"/>
-                </a:gs>
-                <a:gs pos="50000">
-                  <a:srgbClr val="FFFFFF"/>
-                </a:gs>
-                <a:gs pos="53500">
-                  <a:srgbClr val="E6E6E6"/>
-                </a:gs>
-                <a:gs pos="66000">
-                  <a:srgbClr val="7D8496"/>
-                </a:gs>
-                <a:gs pos="73500">
-                  <a:srgbClr val="E6E6E6"/>
-                </a:gs>
-                <a:gs pos="92500">
-                  <a:srgbClr val="7D8496"/>
-                </a:gs>
-                <a:gs pos="100000">
-                  <a:srgbClr val="E6E6E6"/>
-                </a:gs>
-              </a:gsLst>
-              <a:lin ang="2700000" scaled="1"/>
-            </a:gradFill>
-            <a:ln w="9525">
-              <a:solidFill>
-                <a:srgbClr val="C0C0C0"/>
-              </a:solidFill>
-              <a:miter lim="800000"/>
-              <a:headEnd/>
-              <a:tailEnd/>
-            </a:ln>
-          </p:spPr>
-          <p:txBody>
-            <a:bodyPr wrap="none" anchor="ctr"/>
-            <a:lstStyle/>
-            <a:p>
-              <a:endParaRPr lang="en-US" dirty="0"/>
-            </a:p>
-          </p:txBody>
-        </p:sp>
-        <p:sp>
-          <p:nvSpPr>
-            <p:cNvPr id="40980" name="AutoShape 20"/>
-            <p:cNvSpPr>
-              <a:spLocks noChangeArrowheads="1"/>
-            </p:cNvSpPr>
-            <p:nvPr/>
-          </p:nvSpPr>
-          <p:spPr bwMode="gray">
-            <a:xfrm>
-              <a:off x="1200" y="2737"/>
-              <a:ext cx="1349" cy="1167"/>
-            </a:xfrm>
-            <a:prstGeom prst="hexagon">
-              <a:avLst>
-                <a:gd name="adj" fmla="val 28896"/>
-                <a:gd name="vf" fmla="val 115470"/>
-              </a:avLst>
-            </a:prstGeom>
-            <a:gradFill rotWithShape="1">
-              <a:gsLst>
-                <a:gs pos="0">
-                  <a:schemeClr val="hlink">
-                    <a:gamma/>
-                    <a:shade val="46275"/>
-                    <a:invGamma/>
-                  </a:schemeClr>
-                </a:gs>
-                <a:gs pos="100000">
-                  <a:schemeClr val="hlink"/>
-                </a:gs>
-              </a:gsLst>
-              <a:lin ang="2700000" scaled="1"/>
-            </a:gradFill>
-            <a:ln w="9525">
-              <a:solidFill>
-                <a:schemeClr val="tx1"/>
-              </a:solidFill>
-              <a:miter lim="800000"/>
-              <a:headEnd/>
-              <a:tailEnd/>
-            </a:ln>
-            <a:effectLst/>
-          </p:spPr>
-          <p:txBody>
-            <a:bodyPr wrap="none" anchor="ctr"/>
-            <a:lstStyle/>
-            <a:p>
-              <a:pPr>
-                <a:defRPr/>
-              </a:pPr>
-              <a:endParaRPr lang="en-US" dirty="0"/>
-            </a:p>
-          </p:txBody>
-        </p:sp>
-      </p:grpSp>
-      <p:grpSp>
-        <p:nvGrpSpPr>
-          <p:cNvPr id="4108" name="Group 21"/>
-          <p:cNvGrpSpPr>
-            <a:grpSpLocks/>
-          </p:cNvGrpSpPr>
-          <p:nvPr/>
-        </p:nvGrpSpPr>
-        <p:grpSpPr bwMode="auto">
-          <a:xfrm>
-            <a:off x="1828800" y="4473575"/>
-            <a:ext cx="762000" cy="665163"/>
-            <a:chOff x="3174" y="2656"/>
-            <a:chExt cx="1549" cy="1351"/>
-          </a:xfrm>
-        </p:grpSpPr>
-        <p:sp>
-          <p:nvSpPr>
-            <p:cNvPr id="4123" name="AutoShape 22"/>
-            <p:cNvSpPr>
-              <a:spLocks noChangeArrowheads="1"/>
-            </p:cNvSpPr>
-            <p:nvPr/>
-          </p:nvSpPr>
-          <p:spPr bwMode="gray">
-            <a:xfrm>
-              <a:off x="3187" y="2679"/>
-              <a:ext cx="1536" cy="1328"/>
-            </a:xfrm>
-            <a:prstGeom prst="hexagon">
-              <a:avLst>
-                <a:gd name="adj" fmla="val 28916"/>
-                <a:gd name="vf" fmla="val 115470"/>
-              </a:avLst>
-            </a:prstGeom>
-            <a:solidFill>
-              <a:srgbClr val="808080"/>
-            </a:solidFill>
-            <a:ln w="9525">
-              <a:noFill/>
-              <a:miter lim="800000"/>
-              <a:headEnd/>
-              <a:tailEnd/>
-            </a:ln>
-          </p:spPr>
-          <p:txBody>
-            <a:bodyPr wrap="none" anchor="ctr"/>
-            <a:lstStyle/>
-            <a:p>
-              <a:endParaRPr lang="en-US" dirty="0"/>
-            </a:p>
-          </p:txBody>
-        </p:sp>
-        <p:sp>
-          <p:nvSpPr>
-            <p:cNvPr id="4124" name="AutoShape 23"/>
-            <p:cNvSpPr>
-              <a:spLocks noChangeArrowheads="1"/>
-            </p:cNvSpPr>
-            <p:nvPr/>
-          </p:nvSpPr>
-          <p:spPr bwMode="gray">
-            <a:xfrm>
-              <a:off x="3174" y="2656"/>
-              <a:ext cx="1536" cy="1328"/>
-            </a:xfrm>
-            <a:prstGeom prst="hexagon">
-              <a:avLst>
-                <a:gd name="adj" fmla="val 28916"/>
-                <a:gd name="vf" fmla="val 115470"/>
-              </a:avLst>
-            </a:prstGeom>
-            <a:gradFill rotWithShape="1">
-              <a:gsLst>
-                <a:gs pos="0">
-                  <a:srgbClr val="E6E6E6"/>
-                </a:gs>
-                <a:gs pos="7500">
-                  <a:srgbClr val="7D8496"/>
-                </a:gs>
-                <a:gs pos="26500">
-                  <a:srgbClr val="E6E6E6"/>
-                </a:gs>
-                <a:gs pos="34000">
-                  <a:srgbClr val="7D8496"/>
-                </a:gs>
-                <a:gs pos="46500">
-                  <a:srgbClr val="E6E6E6"/>
-                </a:gs>
-                <a:gs pos="50000">
-                  <a:srgbClr val="FFFFFF"/>
-                </a:gs>
-                <a:gs pos="53500">
-                  <a:srgbClr val="E6E6E6"/>
-                </a:gs>
-                <a:gs pos="66000">
-                  <a:srgbClr val="7D8496"/>
-                </a:gs>
-                <a:gs pos="73500">
-                  <a:srgbClr val="E6E6E6"/>
-                </a:gs>
-                <a:gs pos="92500">
-                  <a:srgbClr val="7D8496"/>
-                </a:gs>
-                <a:gs pos="100000">
-                  <a:srgbClr val="E6E6E6"/>
-                </a:gs>
-              </a:gsLst>
-              <a:lin ang="2700000" scaled="1"/>
-            </a:gradFill>
-            <a:ln w="9525">
-              <a:solidFill>
-                <a:srgbClr val="C0C0C0"/>
-              </a:solidFill>
-              <a:miter lim="800000"/>
-              <a:headEnd/>
-              <a:tailEnd/>
-            </a:ln>
-          </p:spPr>
-          <p:txBody>
-            <a:bodyPr wrap="none" anchor="ctr"/>
-            <a:lstStyle/>
-            <a:p>
-              <a:endParaRPr lang="en-US" dirty="0"/>
-            </a:p>
-          </p:txBody>
-        </p:sp>
-        <p:sp>
-          <p:nvSpPr>
-            <p:cNvPr id="40984" name="AutoShape 24"/>
-            <p:cNvSpPr>
-              <a:spLocks noChangeArrowheads="1"/>
-            </p:cNvSpPr>
-            <p:nvPr/>
-          </p:nvSpPr>
-          <p:spPr bwMode="gray">
-            <a:xfrm>
-              <a:off x="3264" y="2737"/>
-              <a:ext cx="1349" cy="1167"/>
-            </a:xfrm>
-            <a:prstGeom prst="hexagon">
-              <a:avLst>
-                <a:gd name="adj" fmla="val 28896"/>
-                <a:gd name="vf" fmla="val 115470"/>
-              </a:avLst>
-            </a:prstGeom>
-            <a:gradFill rotWithShape="1">
-              <a:gsLst>
-                <a:gs pos="0">
-                  <a:schemeClr val="accent1">
-                    <a:gamma/>
-                    <a:shade val="46275"/>
-                    <a:invGamma/>
-                  </a:schemeClr>
-                </a:gs>
-                <a:gs pos="100000">
-                  <a:schemeClr val="accent1"/>
-                </a:gs>
-              </a:gsLst>
-              <a:lin ang="2700000" scaled="1"/>
-            </a:gradFill>
-            <a:ln w="9525">
-              <a:solidFill>
-                <a:schemeClr val="tx1"/>
-              </a:solidFill>
-              <a:miter lim="800000"/>
-              <a:headEnd/>
-              <a:tailEnd/>
-            </a:ln>
-            <a:effectLst/>
-          </p:spPr>
-          <p:txBody>
-            <a:bodyPr wrap="none" anchor="ctr"/>
-            <a:lstStyle/>
-            <a:p>
-              <a:pPr>
-                <a:defRPr/>
-              </a:pPr>
-              <a:endParaRPr lang="en-US" dirty="0"/>
-            </a:p>
-          </p:txBody>
-        </p:sp>
-      </p:grpSp>
-      <p:sp>
-        <p:nvSpPr>
-          <p:cNvPr id="4109" name="Line 25"/>
-          <p:cNvSpPr>
-            <a:spLocks noChangeShapeType="1"/>
-          </p:cNvSpPr>
-          <p:nvPr/>
-        </p:nvSpPr>
-        <p:spPr bwMode="auto">
-          <a:xfrm>
-            <a:off x="2438400" y="4168775"/>
-            <a:ext cx="4800600" cy="0"/>
-          </a:xfrm>
-          <a:prstGeom prst="line">
-            <a:avLst/>
-          </a:prstGeom>
-          <a:noFill/>
-          <a:ln w="25400">
-            <a:solidFill>
-              <a:srgbClr val="C0C0C0"/>
-            </a:solidFill>
-            <a:prstDash val="sysDot"/>
-            <a:round/>
-            <a:headEnd/>
-            <a:tailEnd type="oval" w="med" len="med"/>
-          </a:ln>
-        </p:spPr>
-        <p:txBody>
-          <a:bodyPr wrap="none" anchor="ctr"/>
-          <a:lstStyle/>
-          <a:p>
-            <a:endParaRPr lang="en-US" dirty="0"/>
-          </a:p>
-        </p:txBody>
-      </p:sp>
-      <p:sp>
-        <p:nvSpPr>
-          <p:cNvPr id="4110" name="Text Box 26"/>
-          <p:cNvSpPr txBox="1">
-            <a:spLocks noChangeArrowheads="1"/>
-          </p:cNvSpPr>
-          <p:nvPr/>
-        </p:nvSpPr>
-        <p:spPr bwMode="auto">
-          <a:xfrm>
-            <a:off x="3276600" y="3635375"/>
-            <a:ext cx="1058303" cy="461665"/>
-          </a:xfrm>
-          <a:prstGeom prst="rect">
-            <a:avLst/>
-          </a:prstGeom>
-          <a:noFill/>
-          <a:ln w="9525" algn="ctr">
-            <a:noFill/>
-            <a:miter lim="800000"/>
-            <a:headEnd/>
-            <a:tailEnd/>
-          </a:ln>
-        </p:spPr>
-        <p:txBody>
-          <a:bodyPr wrap="none">
-            <a:spAutoFit/>
-          </a:bodyPr>
-          <a:lstStyle/>
-          <a:p>
-            <a:pPr eaLnBrk="0" hangingPunct="0"/>
-            <a:r>
-              <a:rPr lang="en-US" sz="2400" dirty="0" smtClean="0"/>
-              <a:t>Scope</a:t>
-            </a:r>
-            <a:endParaRPr lang="en-US" sz="2400" dirty="0"/>
-          </a:p>
-        </p:txBody>
-      </p:sp>
-      <p:sp>
-        <p:nvSpPr>
-          <p:cNvPr id="4111" name="Text Box 27"/>
-          <p:cNvSpPr txBox="1">
-            <a:spLocks noChangeArrowheads="1"/>
-          </p:cNvSpPr>
-          <p:nvPr/>
-        </p:nvSpPr>
-        <p:spPr bwMode="gray">
-          <a:xfrm>
-            <a:off x="2025650" y="3657600"/>
-            <a:ext cx="354013" cy="457200"/>
-          </a:xfrm>
-          <a:prstGeom prst="rect">
-            <a:avLst/>
-          </a:prstGeom>
-          <a:noFill/>
-          <a:ln w="9525" algn="ctr">
-            <a:noFill/>
-            <a:miter lim="800000"/>
-            <a:headEnd/>
-            <a:tailEnd/>
-          </a:ln>
-        </p:spPr>
-        <p:txBody>
-          <a:bodyPr wrap="none">
-            <a:spAutoFit/>
-          </a:bodyPr>
-          <a:lstStyle/>
-          <a:p>
-            <a:pPr algn="ctr" eaLnBrk="0" hangingPunct="0"/>
-            <a:r>
-              <a:rPr lang="en-US" sz="2400" b="1" dirty="0">
-                <a:solidFill>
-                  <a:schemeClr val="bg1"/>
-                </a:solidFill>
-              </a:rPr>
-              <a:t>3</a:t>
-            </a:r>
-          </a:p>
-        </p:txBody>
-      </p:sp>
-      <p:sp>
-        <p:nvSpPr>
-          <p:cNvPr id="4112" name="Line 28"/>
-          <p:cNvSpPr>
-            <a:spLocks noChangeShapeType="1"/>
-          </p:cNvSpPr>
-          <p:nvPr/>
-        </p:nvSpPr>
-        <p:spPr bwMode="auto">
-          <a:xfrm>
-            <a:off x="2438400" y="5083175"/>
-            <a:ext cx="4800600" cy="0"/>
-          </a:xfrm>
-          <a:prstGeom prst="line">
-            <a:avLst/>
-          </a:prstGeom>
-          <a:noFill/>
-          <a:ln w="25400">
-            <a:solidFill>
-              <a:srgbClr val="C0C0C0"/>
-            </a:solidFill>
-            <a:prstDash val="sysDot"/>
-            <a:round/>
-            <a:headEnd/>
-            <a:tailEnd type="oval" w="med" len="med"/>
-          </a:ln>
-        </p:spPr>
-        <p:txBody>
-          <a:bodyPr wrap="none" anchor="ctr"/>
-          <a:lstStyle/>
-          <a:p>
-            <a:endParaRPr lang="en-US" dirty="0"/>
-          </a:p>
-        </p:txBody>
-      </p:sp>
-      <p:sp>
-        <p:nvSpPr>
-          <p:cNvPr id="4113" name="Text Box 29"/>
-          <p:cNvSpPr txBox="1">
-            <a:spLocks noChangeArrowheads="1"/>
-          </p:cNvSpPr>
-          <p:nvPr/>
-        </p:nvSpPr>
-        <p:spPr bwMode="auto">
-          <a:xfrm>
-            <a:off x="3276600" y="4549775"/>
-            <a:ext cx="973343" cy="461665"/>
-          </a:xfrm>
-          <a:prstGeom prst="rect">
-            <a:avLst/>
-          </a:prstGeom>
-          <a:noFill/>
-          <a:ln w="9525" algn="ctr">
-            <a:noFill/>
-            <a:miter lim="800000"/>
-            <a:headEnd/>
-            <a:tailEnd/>
-          </a:ln>
-        </p:spPr>
-        <p:txBody>
-          <a:bodyPr wrap="none">
-            <a:spAutoFit/>
-          </a:bodyPr>
-          <a:lstStyle/>
-          <a:p>
-            <a:pPr eaLnBrk="0" hangingPunct="0"/>
-            <a:r>
-              <a:rPr lang="en-US" sz="2400" dirty="0" smtClean="0"/>
-              <a:t>Detail</a:t>
-            </a:r>
-            <a:endParaRPr lang="en-US" sz="2400" dirty="0"/>
-          </a:p>
-        </p:txBody>
-      </p:sp>
-      <p:sp>
-        <p:nvSpPr>
-          <p:cNvPr id="4114" name="Text Box 30"/>
-          <p:cNvSpPr txBox="1">
-            <a:spLocks noChangeArrowheads="1"/>
-          </p:cNvSpPr>
-          <p:nvPr/>
-        </p:nvSpPr>
-        <p:spPr bwMode="gray">
-          <a:xfrm>
-            <a:off x="2025650" y="4572000"/>
-            <a:ext cx="354013" cy="457200"/>
-          </a:xfrm>
-          <a:prstGeom prst="rect">
-            <a:avLst/>
-          </a:prstGeom>
-          <a:noFill/>
-          <a:ln w="9525" algn="ctr">
-            <a:noFill/>
-            <a:miter lim="800000"/>
-            <a:headEnd/>
-            <a:tailEnd/>
-          </a:ln>
-        </p:spPr>
-        <p:txBody>
-          <a:bodyPr wrap="none">
-            <a:spAutoFit/>
-          </a:bodyPr>
-          <a:lstStyle/>
-          <a:p>
-            <a:pPr algn="ctr" eaLnBrk="0" hangingPunct="0"/>
-            <a:r>
-              <a:rPr lang="en-US" sz="2400" b="1" dirty="0">
-                <a:solidFill>
-                  <a:schemeClr val="bg1"/>
-                </a:solidFill>
-              </a:rPr>
-              <a:t>4</a:t>
-            </a:r>
-          </a:p>
-        </p:txBody>
-      </p:sp>
-      <p:sp>
-        <p:nvSpPr>
-          <p:cNvPr id="4115" name="Slide Number Placeholder 32"/>
-          <p:cNvSpPr>
-            <a:spLocks noGrp="1"/>
-          </p:cNvSpPr>
-          <p:nvPr>
-            <p:ph type="sldNum" sz="quarter" idx="12"/>
-          </p:nvPr>
-        </p:nvSpPr>
-        <p:spPr>
-          <a:noFill/>
-        </p:spPr>
-        <p:txBody>
-          <a:bodyPr/>
-          <a:lstStyle/>
-          <a:p>
-            <a:fld id="{8E64E13D-8F49-4D86-B09B-1E00BF74E486}" type="slidenum">
-              <a:rPr lang="en-US" smtClean="0"/>
-              <a:pPr/>
-              <a:t>2</a:t>
-            </a:fld>
-            <a:endParaRPr lang="en-US" dirty="0" smtClean="0"/>
-          </a:p>
-        </p:txBody>
-      </p:sp>
-      <p:pic>
-        <p:nvPicPr>
-          <p:cNvPr id="33" name="Picture 32" descr="logo_final.png"/>
-          <p:cNvPicPr>
-            <a:picLocks noChangeAspect="1"/>
-          </p:cNvPicPr>
-          <p:nvPr/>
-        </p:nvPicPr>
-        <p:blipFill>
-          <a:blip r:embed="rId2" cstate="print"/>
-          <a:stretch>
-            <a:fillRect/>
-          </a:stretch>
-        </p:blipFill>
-        <p:spPr>
-          <a:xfrm>
-            <a:off x="8001000" y="0"/>
-            <a:ext cx="1219200" cy="1219200"/>
-          </a:xfrm>
-          <a:prstGeom prst="rect">
-            <a:avLst/>
-          </a:prstGeom>
-        </p:spPr>
-      </p:pic>
-    </p:spTree>
-  </p:cSld>
-  <p:clrMapOvr>
-    <a:masterClrMapping/>
-  </p:clrMapOvr>
-  <p:timing>
-    <p:tnLst>
-      <p:par>
-        <p:cTn id="1" dur="indefinite" restart="never" nodeType="tmRoot"/>
-      </p:par>
-    </p:tnLst>
-  </p:timing>
-</p:sld>
-</file>
-
-<file path=ppt/slides/slide20.xml><?xml version="1.0" encoding="utf-8"?>
+<file path=ppt/slides/slide21.xml><?xml version="1.0" encoding="utf-8"?>
 <p:sld xmlns:a="http://schemas.openxmlformats.org/drawingml/2006/main" xmlns:r="http://schemas.openxmlformats.org/officeDocument/2006/relationships" xmlns:p="http://schemas.openxmlformats.org/presentationml/2006/main">
   <p:cSld>
     <p:spTree>
@@ -15542,7 +15760,7 @@
             <a:fld id="{F5BCDF94-7E80-425E-976D-29EA7A243127}" type="slidenum">
               <a:rPr lang="en-US" smtClean="0"/>
               <a:pPr/>
-              <a:t>20</a:t>
+              <a:t>21</a:t>
             </a:fld>
             <a:endParaRPr lang="en-US" dirty="0" smtClean="0"/>
           </a:p>
@@ -15661,7 +15879,7 @@
 </p:sld>
 </file>
 
-<file path=ppt/slides/slide21.xml><?xml version="1.0" encoding="utf-8"?>
+<file path=ppt/slides/slide22.xml><?xml version="1.0" encoding="utf-8"?>
 <p:sld xmlns:a="http://schemas.openxmlformats.org/drawingml/2006/main" xmlns:r="http://schemas.openxmlformats.org/officeDocument/2006/relationships" xmlns:p="http://schemas.openxmlformats.org/presentationml/2006/main">
   <p:cSld>
     <p:spTree>
@@ -15701,7 +15919,7 @@
               <a:pPr>
                 <a:defRPr/>
               </a:pPr>
-              <a:t>21</a:t>
+              <a:t>22</a:t>
             </a:fld>
             <a:endParaRPr lang="en-US" dirty="0"/>
           </a:p>
@@ -16929,7 +17147,7 @@
 </p:sld>
 </file>
 
-<file path=ppt/slides/slide22.xml><?xml version="1.0" encoding="utf-8"?>
+<file path=ppt/slides/slide23.xml><?xml version="1.0" encoding="utf-8"?>
 <p:sld xmlns:a="http://schemas.openxmlformats.org/drawingml/2006/main" xmlns:r="http://schemas.openxmlformats.org/officeDocument/2006/relationships" xmlns:p="http://schemas.openxmlformats.org/presentationml/2006/main">
   <p:cSld>
     <p:spTree>
@@ -16969,7 +17187,7 @@
               <a:pPr>
                 <a:defRPr/>
               </a:pPr>
-              <a:t>22</a:t>
+              <a:t>23</a:t>
             </a:fld>
             <a:endParaRPr lang="en-US" dirty="0"/>
           </a:p>
@@ -18397,7 +18615,7 @@
 </p:sld>
 </file>
 
-<file path=ppt/slides/slide23.xml><?xml version="1.0" encoding="utf-8"?>
+<file path=ppt/slides/slide24.xml><?xml version="1.0" encoding="utf-8"?>
 <p:sld xmlns:a="http://schemas.openxmlformats.org/drawingml/2006/main" xmlns:r="http://schemas.openxmlformats.org/officeDocument/2006/relationships" xmlns:p="http://schemas.openxmlformats.org/presentationml/2006/main">
   <p:cSld>
     <p:spTree>
@@ -18437,7 +18655,7 @@
               <a:pPr>
                 <a:defRPr/>
               </a:pPr>
-              <a:t>23</a:t>
+              <a:t>24</a:t>
             </a:fld>
             <a:endParaRPr lang="en-US" dirty="0"/>
           </a:p>
@@ -20097,7 +20315,7 @@
 </p:sld>
 </file>
 
-<file path=ppt/slides/slide24.xml><?xml version="1.0" encoding="utf-8"?>
+<file path=ppt/slides/slide25.xml><?xml version="1.0" encoding="utf-8"?>
 <p:sld xmlns:a="http://schemas.openxmlformats.org/drawingml/2006/main" xmlns:r="http://schemas.openxmlformats.org/officeDocument/2006/relationships" xmlns:p="http://schemas.openxmlformats.org/presentationml/2006/main">
   <p:cSld>
     <p:spTree>
@@ -20137,7 +20355,7 @@
               <a:pPr>
                 <a:defRPr/>
               </a:pPr>
-              <a:t>24</a:t>
+              <a:t>25</a:t>
             </a:fld>
             <a:endParaRPr lang="en-US" dirty="0"/>
           </a:p>
@@ -21158,7 +21376,7 @@
 </p:sld>
 </file>
 
-<file path=ppt/slides/slide25.xml><?xml version="1.0" encoding="utf-8"?>
+<file path=ppt/slides/slide26.xml><?xml version="1.0" encoding="utf-8"?>
 <p:sld xmlns:a="http://schemas.openxmlformats.org/drawingml/2006/main" xmlns:r="http://schemas.openxmlformats.org/officeDocument/2006/relationships" xmlns:p="http://schemas.openxmlformats.org/presentationml/2006/main">
   <p:cSld>
     <p:spTree>
@@ -21284,7 +21502,7 @@
             <a:fld id="{57D72D41-4CC2-45AF-B9B1-09A5B105366C}" type="slidenum">
               <a:rPr lang="en-US" smtClean="0"/>
               <a:pPr/>
-              <a:t>25</a:t>
+              <a:t>26</a:t>
             </a:fld>
             <a:endParaRPr lang="en-US" dirty="0" smtClean="0"/>
           </a:p>
@@ -21335,229 +21553,6 @@
           </a:p>
         </p:txBody>
       </p:sp>
-    </p:spTree>
-  </p:cSld>
-  <p:clrMapOvr>
-    <a:masterClrMapping/>
-  </p:clrMapOvr>
-  <p:timing>
-    <p:tnLst>
-      <p:par>
-        <p:cTn id="1" dur="indefinite" restart="never" nodeType="tmRoot"/>
-      </p:par>
-    </p:tnLst>
-  </p:timing>
-</p:sld>
-</file>
-
-<file path=ppt/slides/slide26.xml><?xml version="1.0" encoding="utf-8"?>
-<p:sld xmlns:a="http://schemas.openxmlformats.org/drawingml/2006/main" xmlns:r="http://schemas.openxmlformats.org/officeDocument/2006/relationships" xmlns:p="http://schemas.openxmlformats.org/presentationml/2006/main">
-  <p:cSld>
-    <p:spTree>
-      <p:nvGrpSpPr>
-        <p:cNvPr id="1" name=""/>
-        <p:cNvGrpSpPr/>
-        <p:nvPr/>
-      </p:nvGrpSpPr>
-      <p:grpSpPr>
-        <a:xfrm>
-          <a:off x="0" y="0"/>
-          <a:ext cx="0" cy="0"/>
-          <a:chOff x="0" y="0"/>
-          <a:chExt cx="0" cy="0"/>
-        </a:xfrm>
-      </p:grpSpPr>
-      <p:sp>
-        <p:nvSpPr>
-          <p:cNvPr id="3" name="Content Placeholder 2"/>
-          <p:cNvSpPr>
-            <a:spLocks noGrp="1"/>
-          </p:cNvSpPr>
-          <p:nvPr>
-            <p:ph idx="1"/>
-          </p:nvPr>
-        </p:nvSpPr>
-        <p:spPr/>
-        <p:txBody>
-          <a:bodyPr/>
-          <a:lstStyle/>
-          <a:p>
-            <a:pPr eaLnBrk="1" hangingPunct="1"/>
-            <a:r>
-              <a:rPr lang="en-US" b="1" dirty="0" smtClean="0"/>
-              <a:t>Android application</a:t>
-            </a:r>
-            <a:r>
-              <a:rPr lang="en-US" dirty="0" smtClean="0"/>
-              <a:t>:</a:t>
-            </a:r>
-          </a:p>
-          <a:p>
-            <a:pPr lvl="1" eaLnBrk="1" hangingPunct="1"/>
-            <a:r>
-              <a:rPr lang="en-US" dirty="0" smtClean="0"/>
-              <a:t>Receives control commands from PC.</a:t>
-            </a:r>
-          </a:p>
-          <a:p>
-            <a:pPr lvl="1" eaLnBrk="1" hangingPunct="1"/>
-            <a:r>
-              <a:rPr lang="en-US" dirty="0" smtClean="0"/>
-              <a:t>Sends control commands to Quadrocopter.</a:t>
-            </a:r>
-          </a:p>
-          <a:p>
-            <a:pPr lvl="1" eaLnBrk="1" hangingPunct="1"/>
-            <a:r>
-              <a:rPr lang="en-US" dirty="0" smtClean="0"/>
-              <a:t>Send video and Sensor’s statuses to PC.</a:t>
-            </a:r>
-          </a:p>
-          <a:p>
-            <a:pPr lvl="1" eaLnBrk="1" hangingPunct="1"/>
-            <a:r>
-              <a:rPr lang="en-US" dirty="0" smtClean="0"/>
-              <a:t>Easy to use.</a:t>
-            </a:r>
-          </a:p>
-          <a:p>
-            <a:pPr lvl="1" eaLnBrk="1" hangingPunct="1"/>
-            <a:r>
-              <a:rPr lang="en-US" dirty="0" smtClean="0"/>
-              <a:t>Easy to maintain and update.</a:t>
-            </a:r>
-          </a:p>
-          <a:p>
-            <a:endParaRPr lang="en-US" b="1" dirty="0"/>
-          </a:p>
-        </p:txBody>
-      </p:sp>
-      <p:sp>
-        <p:nvSpPr>
-          <p:cNvPr id="4" name="Slide Number Placeholder 3"/>
-          <p:cNvSpPr>
-            <a:spLocks noGrp="1"/>
-          </p:cNvSpPr>
-          <p:nvPr>
-            <p:ph type="sldNum" sz="quarter" idx="12"/>
-          </p:nvPr>
-        </p:nvSpPr>
-        <p:spPr/>
-        <p:txBody>
-          <a:bodyPr/>
-          <a:lstStyle/>
-          <a:p>
-            <a:pPr>
-              <a:defRPr/>
-            </a:pPr>
-            <a:fld id="{20C98071-8A9B-444A-806A-782BE84EBE4B}" type="slidenum">
-              <a:rPr lang="en-US" smtClean="0"/>
-              <a:pPr>
-                <a:defRPr/>
-              </a:pPr>
-              <a:t>26</a:t>
-            </a:fld>
-            <a:endParaRPr lang="en-US" dirty="0"/>
-          </a:p>
-        </p:txBody>
-      </p:sp>
-      <p:sp>
-        <p:nvSpPr>
-          <p:cNvPr id="9" name="Title 1"/>
-          <p:cNvSpPr>
-            <a:spLocks noGrp="1"/>
-          </p:cNvSpPr>
-          <p:nvPr>
-            <p:ph type="title"/>
-          </p:nvPr>
-        </p:nvSpPr>
-        <p:spPr>
-          <a:xfrm>
-            <a:off x="2971800" y="319088"/>
-            <a:ext cx="4876800" cy="563562"/>
-          </a:xfrm>
-        </p:spPr>
-        <p:txBody>
-          <a:bodyPr/>
-          <a:lstStyle/>
-          <a:p>
-            <a:pPr algn="l" eaLnBrk="1" hangingPunct="1"/>
-            <a:r>
-              <a:rPr lang="en-US" dirty="0" smtClean="0"/>
-              <a:t>Android application</a:t>
-            </a:r>
-          </a:p>
-        </p:txBody>
-      </p:sp>
-      <p:sp>
-        <p:nvSpPr>
-          <p:cNvPr id="10" name="Rounded Rectangle 9"/>
-          <p:cNvSpPr/>
-          <p:nvPr/>
-        </p:nvSpPr>
-        <p:spPr>
-          <a:xfrm>
-            <a:off x="304800" y="152400"/>
-            <a:ext cx="2667000" cy="838200"/>
-          </a:xfrm>
-          <a:prstGeom prst="roundRect">
-            <a:avLst/>
-          </a:prstGeom>
-          <a:solidFill>
-            <a:srgbClr val="7030A0"/>
-          </a:solidFill>
-        </p:spPr>
-        <p:style>
-          <a:lnRef idx="3">
-            <a:schemeClr val="lt1"/>
-          </a:lnRef>
-          <a:fillRef idx="1">
-            <a:schemeClr val="dk1"/>
-          </a:fillRef>
-          <a:effectRef idx="1">
-            <a:schemeClr val="dk1"/>
-          </a:effectRef>
-          <a:fontRef idx="minor">
-            <a:schemeClr val="lt1"/>
-          </a:fontRef>
-        </p:style>
-        <p:txBody>
-          <a:bodyPr rtlCol="0" anchor="ctr"/>
-          <a:lstStyle/>
-          <a:p>
-            <a:pPr algn="ctr"/>
-            <a:r>
-              <a:rPr lang="en-US" sz="4000" dirty="0" smtClean="0"/>
-              <a:t>Detail</a:t>
-            </a:r>
-            <a:endParaRPr lang="en-US" sz="4000" dirty="0"/>
-          </a:p>
-        </p:txBody>
-      </p:sp>
-      <p:pic>
-        <p:nvPicPr>
-          <p:cNvPr id="6" name="Picture 5" descr="logo_final.png"/>
-          <p:cNvPicPr>
-            <a:picLocks noChangeAspect="1"/>
-          </p:cNvPicPr>
-          <p:nvPr/>
-        </p:nvPicPr>
-        <p:blipFill>
-          <a:blip r:embed="rId2" cstate="print"/>
-          <a:stretch>
-            <a:fillRect/>
-          </a:stretch>
-        </p:blipFill>
-        <p:spPr>
-          <a:xfrm>
-            <a:off x="8001000" y="0"/>
-            <a:ext cx="1219200" cy="1219200"/>
-          </a:xfrm>
-          <a:prstGeom prst="rect">
-            <a:avLst/>
-          </a:prstGeom>
-        </p:spPr>
-      </p:pic>
     </p:spTree>
   </p:cSld>
   <p:clrMapOvr>
@@ -21608,35 +21603,39 @@
             <a:pPr eaLnBrk="1" hangingPunct="1"/>
             <a:r>
               <a:rPr lang="en-US" b="1" dirty="0" smtClean="0"/>
-              <a:t>Embedded Software:</a:t>
+              <a:t>Android application</a:t>
+            </a:r>
+            <a:r>
+              <a:rPr lang="en-US" dirty="0" smtClean="0"/>
+              <a:t>:</a:t>
             </a:r>
           </a:p>
           <a:p>
             <a:pPr lvl="1" eaLnBrk="1" hangingPunct="1"/>
             <a:r>
               <a:rPr lang="en-US" dirty="0" smtClean="0"/>
-              <a:t>Receive control command from Android Smart Phone and control the motors.</a:t>
+              <a:t>Receives control commands from PC.</a:t>
             </a:r>
           </a:p>
           <a:p>
             <a:pPr lvl="1" eaLnBrk="1" hangingPunct="1"/>
             <a:r>
               <a:rPr lang="en-US" dirty="0" smtClean="0"/>
-              <a:t>Send Sensor’s output to Android Smart Phone at a desirable rate. </a:t>
+              <a:t>Sends control commands to Quadrocopter.</a:t>
             </a:r>
           </a:p>
           <a:p>
             <a:pPr lvl="1" eaLnBrk="1" hangingPunct="1"/>
             <a:r>
               <a:rPr lang="en-US" dirty="0" smtClean="0"/>
-              <a:t>Go into Autonomous Mode when no control command is received from pilot.</a:t>
+              <a:t>Send video and Sensor’s statuses to PC.</a:t>
             </a:r>
           </a:p>
           <a:p>
             <a:pPr lvl="1" eaLnBrk="1" hangingPunct="1"/>
             <a:r>
               <a:rPr lang="en-US" dirty="0" smtClean="0"/>
-              <a:t>Use Bluetooth RS232 communication method to communicate with Android Smart Phone.</a:t>
+              <a:t>Easy to use.</a:t>
             </a:r>
           </a:p>
           <a:p>
@@ -21682,7 +21681,7 @@
       </p:sp>
       <p:sp>
         <p:nvSpPr>
-          <p:cNvPr id="6" name="Title 1"/>
+          <p:cNvPr id="9" name="Title 1"/>
           <p:cNvSpPr>
             <a:spLocks noGrp="1"/>
           </p:cNvSpPr>
@@ -21703,14 +21702,14 @@
             <a:pPr algn="l" eaLnBrk="1" hangingPunct="1"/>
             <a:r>
               <a:rPr lang="en-US" dirty="0" smtClean="0"/>
-              <a:t>Embedded Software</a:t>
+              <a:t>Android application</a:t>
             </a:r>
           </a:p>
         </p:txBody>
       </p:sp>
       <p:sp>
         <p:nvSpPr>
-          <p:cNvPr id="7" name="Rounded Rectangle 6"/>
+          <p:cNvPr id="10" name="Rounded Rectangle 9"/>
           <p:cNvSpPr/>
           <p:nvPr/>
         </p:nvSpPr>
@@ -21755,7 +21754,7 @@
       </p:sp>
       <p:pic>
         <p:nvPicPr>
-          <p:cNvPr id="8" name="Picture 7" descr="logo_final.png"/>
+          <p:cNvPr id="6" name="Picture 5" descr="logo_final.png"/>
           <p:cNvPicPr>
             <a:picLocks noChangeAspect="1"/>
           </p:cNvPicPr>
@@ -21827,67 +21826,43 @@
             <a:pPr eaLnBrk="1" hangingPunct="1"/>
             <a:r>
               <a:rPr lang="en-US" b="1" dirty="0" smtClean="0"/>
-              <a:t>Embedded Hardware:</a:t>
+              <a:t>Embedded Software:</a:t>
             </a:r>
           </a:p>
           <a:p>
             <a:pPr lvl="1" eaLnBrk="1" hangingPunct="1"/>
             <a:r>
               <a:rPr lang="en-US" dirty="0" smtClean="0"/>
-              <a:t>Build a Quadrocopter frame which has space for a 150gr Smart Phone.</a:t>
+              <a:t>Receive control command from Android Smart Phone and control the motors.</a:t>
             </a:r>
           </a:p>
           <a:p>
             <a:pPr lvl="1" eaLnBrk="1" hangingPunct="1"/>
             <a:r>
               <a:rPr lang="en-US" dirty="0" smtClean="0"/>
-              <a:t>Design a PCB board for controlling the Quadrocopter, it should has:</a:t>
-            </a:r>
-          </a:p>
-          <a:p>
-            <a:pPr lvl="2" eaLnBrk="1" hangingPunct="1"/>
-            <a:r>
-              <a:rPr lang="en-US" dirty="0" smtClean="0"/>
-              <a:t>Bluetooth module.</a:t>
-            </a:r>
-          </a:p>
-          <a:p>
-            <a:pPr lvl="2" eaLnBrk="1" hangingPunct="1"/>
-            <a:r>
-              <a:rPr lang="en-US" dirty="0" smtClean="0"/>
-              <a:t>At least 4 PWM generators</a:t>
-            </a:r>
-          </a:p>
-          <a:p>
-            <a:pPr lvl="2" eaLnBrk="1" hangingPunct="1"/>
-            <a:r>
-              <a:rPr lang="en-US" dirty="0" smtClean="0"/>
-              <a:t>Tri-angle Accelerometer and Gyroscope sensors.</a:t>
+              <a:t>Send Sensor’s output to Android Smart Phone at a desirable rate. </a:t>
             </a:r>
           </a:p>
           <a:p>
             <a:pPr lvl="1" eaLnBrk="1" hangingPunct="1"/>
             <a:r>
               <a:rPr lang="en-US" dirty="0" smtClean="0"/>
-              <a:t>Motors, ESCs, Batteries can be bought from the market. </a:t>
+              <a:t>Go into Autonomous Mode when no control command is received from pilot.</a:t>
             </a:r>
           </a:p>
           <a:p>
-            <a:pPr lvl="2" eaLnBrk="1" hangingPunct="1"/>
+            <a:pPr lvl="1" eaLnBrk="1" hangingPunct="1"/>
             <a:r>
               <a:rPr lang="en-US" dirty="0" smtClean="0"/>
-              <a:t>Motor’s thrust &gt; 800gr</a:t>
+              <a:t>Use Bluetooth RS232 communication method to communicate with Android Smart Phone.</a:t>
             </a:r>
           </a:p>
           <a:p>
-            <a:pPr lvl="2" eaLnBrk="1" hangingPunct="1"/>
+            <a:pPr lvl="1" eaLnBrk="1" hangingPunct="1"/>
             <a:r>
               <a:rPr lang="en-US" dirty="0" smtClean="0"/>
-              <a:t>Batteries: 4400mAh</a:t>
+              <a:t>Easy to maintain and update.</a:t>
             </a:r>
-          </a:p>
-          <a:p>
-            <a:endParaRPr lang="en-US" b="1" dirty="0" smtClean="0"/>
           </a:p>
           <a:p>
             <a:endParaRPr lang="en-US" b="1" dirty="0"/>
@@ -21946,7 +21921,7 @@
             <a:pPr algn="l" eaLnBrk="1" hangingPunct="1"/>
             <a:r>
               <a:rPr lang="en-US" dirty="0" smtClean="0"/>
-              <a:t>Embedded Hardware</a:t>
+              <a:t>Embedded Software</a:t>
             </a:r>
           </a:p>
         </p:txBody>
@@ -22054,152 +22029,92 @@
       </p:grpSpPr>
       <p:sp>
         <p:nvSpPr>
-          <p:cNvPr id="18434" name="Rectangle 2"/>
+          <p:cNvPr id="3" name="Content Placeholder 2"/>
           <p:cNvSpPr>
-            <a:spLocks noGrp="1" noChangeArrowheads="1"/>
+            <a:spLocks noGrp="1"/>
           </p:cNvSpPr>
           <p:nvPr>
-            <p:ph type="subTitle" idx="1"/>
+            <p:ph idx="1"/>
           </p:nvPr>
         </p:nvSpPr>
-        <p:spPr>
-          <a:xfrm>
-            <a:off x="1295400" y="3733800"/>
-            <a:ext cx="6400800" cy="685800"/>
-          </a:xfrm>
-        </p:spPr>
+        <p:spPr/>
         <p:txBody>
           <a:bodyPr/>
           <a:lstStyle/>
           <a:p>
             <a:pPr eaLnBrk="1" hangingPunct="1"/>
             <a:r>
+              <a:rPr lang="en-US" b="1" dirty="0" smtClean="0"/>
+              <a:t>Embedded Hardware:</a:t>
+            </a:r>
+          </a:p>
+          <a:p>
+            <a:pPr lvl="1" eaLnBrk="1" hangingPunct="1"/>
+            <a:r>
               <a:rPr lang="en-US" dirty="0" smtClean="0"/>
-              <a:t>www.themegallery.com</a:t>
+              <a:t>Build a Quadrocopter frame which has space for a 150gr Smart Phone.</a:t>
             </a:r>
+          </a:p>
+          <a:p>
+            <a:pPr lvl="1" eaLnBrk="1" hangingPunct="1"/>
+            <a:r>
+              <a:rPr lang="en-US" dirty="0" smtClean="0"/>
+              <a:t>Design a PCB board for controlling the Quadrocopter, it should has:</a:t>
+            </a:r>
+          </a:p>
+          <a:p>
+            <a:pPr lvl="2" eaLnBrk="1" hangingPunct="1"/>
+            <a:r>
+              <a:rPr lang="en-US" dirty="0" smtClean="0"/>
+              <a:t>Bluetooth module.</a:t>
+            </a:r>
+          </a:p>
+          <a:p>
+            <a:pPr lvl="2" eaLnBrk="1" hangingPunct="1"/>
+            <a:r>
+              <a:rPr lang="en-US" dirty="0" smtClean="0"/>
+              <a:t>At least 4 PWM generators</a:t>
+            </a:r>
+          </a:p>
+          <a:p>
+            <a:pPr lvl="2" eaLnBrk="1" hangingPunct="1"/>
+            <a:r>
+              <a:rPr lang="en-US" dirty="0" smtClean="0"/>
+              <a:t>Tri-angle Accelerometer and Gyroscope sensors.</a:t>
+            </a:r>
+          </a:p>
+          <a:p>
+            <a:pPr lvl="1" eaLnBrk="1" hangingPunct="1"/>
+            <a:r>
+              <a:rPr lang="en-US" dirty="0" smtClean="0"/>
+              <a:t>Motors, ESCs, Batteries can be bought from the market. </a:t>
+            </a:r>
+          </a:p>
+          <a:p>
+            <a:pPr lvl="2" eaLnBrk="1" hangingPunct="1"/>
+            <a:r>
+              <a:rPr lang="en-US" dirty="0" smtClean="0"/>
+              <a:t>Motor’s thrust &gt; 800gr</a:t>
+            </a:r>
+          </a:p>
+          <a:p>
+            <a:pPr lvl="2" eaLnBrk="1" hangingPunct="1"/>
+            <a:r>
+              <a:rPr lang="en-US" dirty="0" smtClean="0"/>
+              <a:t>Batteries: 4400mAh</a:t>
+            </a:r>
+          </a:p>
+          <a:p>
+            <a:endParaRPr lang="en-US" b="1" dirty="0" smtClean="0"/>
+          </a:p>
+          <a:p>
+            <a:endParaRPr lang="en-US" b="1" dirty="0"/>
           </a:p>
         </p:txBody>
       </p:sp>
       <p:sp>
         <p:nvSpPr>
-          <p:cNvPr id="18435" name="WordArt 3"/>
-          <p:cNvSpPr>
-            <a:spLocks noChangeArrowheads="1" noChangeShapeType="1" noTextEdit="1"/>
-          </p:cNvSpPr>
-          <p:nvPr/>
-        </p:nvSpPr>
-        <p:spPr bwMode="gray">
-          <a:xfrm>
-            <a:off x="2362200" y="4343400"/>
-            <a:ext cx="4724400" cy="609600"/>
-          </a:xfrm>
-          <a:prstGeom prst="rect">
-            <a:avLst/>
-          </a:prstGeom>
-        </p:spPr>
-        <p:txBody>
-          <a:bodyPr wrap="none" fromWordArt="1">
-            <a:prstTxWarp prst="textDeflate">
-              <a:avLst>
-                <a:gd name="adj" fmla="val 0"/>
-              </a:avLst>
-            </a:prstTxWarp>
-          </a:bodyPr>
-          <a:lstStyle/>
-          <a:p>
-            <a:pPr algn="ctr"/>
-            <a:r>
-              <a:rPr lang="en-US" sz="5400" b="1" kern="10" dirty="0">
-                <a:ln w="28575">
-                  <a:solidFill>
-                    <a:schemeClr val="bg1"/>
-                  </a:solidFill>
-                  <a:round/>
-                  <a:headEnd/>
-                  <a:tailEnd/>
-                </a:ln>
-                <a:gradFill rotWithShape="1">
-                  <a:gsLst>
-                    <a:gs pos="0">
-                      <a:schemeClr val="tx1"/>
-                    </a:gs>
-                    <a:gs pos="100000">
-                      <a:schemeClr val="accent2"/>
-                    </a:gs>
-                  </a:gsLst>
-                  <a:lin ang="5400000" scaled="1"/>
-                </a:gradFill>
-                <a:effectLst>
-                  <a:outerShdw dist="107763" dir="2700000" algn="ctr" rotWithShape="0">
-                    <a:srgbClr val="000000">
-                      <a:alpha val="50000"/>
-                    </a:srgbClr>
-                  </a:outerShdw>
-                </a:effectLst>
-                <a:latin typeface="Verdana"/>
-                <a:ea typeface="Verdana"/>
-                <a:cs typeface="Verdana"/>
-              </a:rPr>
-              <a:t>Thank You !</a:t>
-            </a:r>
-          </a:p>
-        </p:txBody>
-      </p:sp>
-      <p:sp>
-        <p:nvSpPr>
-          <p:cNvPr id="18436" name="Rectangle 4"/>
-          <p:cNvSpPr>
-            <a:spLocks noChangeArrowheads="1"/>
-          </p:cNvSpPr>
-          <p:nvPr/>
-        </p:nvSpPr>
-        <p:spPr bwMode="white">
-          <a:xfrm>
-            <a:off x="1524000" y="5181600"/>
-            <a:ext cx="7086600" cy="381000"/>
-          </a:xfrm>
-          <a:prstGeom prst="rect">
-            <a:avLst/>
-          </a:prstGeom>
-          <a:noFill/>
-          <a:ln w="9525">
-            <a:noFill/>
-            <a:miter lim="800000"/>
-            <a:headEnd/>
-            <a:tailEnd/>
-          </a:ln>
-        </p:spPr>
-        <p:txBody>
-          <a:bodyPr/>
-          <a:lstStyle/>
-          <a:p>
-            <a:pPr algn="ctr">
-              <a:lnSpc>
-                <a:spcPct val="90000"/>
-              </a:lnSpc>
-              <a:spcBef>
-                <a:spcPct val="20000"/>
-              </a:spcBef>
-              <a:buClr>
-                <a:schemeClr val="hlink"/>
-              </a:buClr>
-              <a:buFont typeface="Wingdings" pitchFamily="2" charset="2"/>
-              <a:buNone/>
-            </a:pPr>
-            <a:r>
-              <a:rPr lang="en-US" sz="2000" dirty="0">
-                <a:solidFill>
-                  <a:schemeClr val="bg1"/>
-                </a:solidFill>
-              </a:rPr>
-              <a:t>Confidential document</a:t>
-            </a:r>
-          </a:p>
-        </p:txBody>
-      </p:sp>
-      <p:sp>
-        <p:nvSpPr>
-          <p:cNvPr id="18437" name="Slide Number Placeholder 6"/>
+          <p:cNvPr id="4" name="Slide Number Placeholder 3"/>
           <p:cNvSpPr>
             <a:spLocks noGrp="1"/>
           </p:cNvSpPr>
@@ -22207,25 +22122,101 @@
             <p:ph type="sldNum" sz="quarter" idx="12"/>
           </p:nvPr>
         </p:nvSpPr>
+        <p:spPr/>
+        <p:txBody>
+          <a:bodyPr/>
+          <a:lstStyle/>
+          <a:p>
+            <a:pPr>
+              <a:defRPr/>
+            </a:pPr>
+            <a:fld id="{20C98071-8A9B-444A-806A-782BE84EBE4B}" type="slidenum">
+              <a:rPr lang="en-US" smtClean="0"/>
+              <a:pPr>
+                <a:defRPr/>
+              </a:pPr>
+              <a:t>29</a:t>
+            </a:fld>
+            <a:endParaRPr lang="en-US" dirty="0"/>
+          </a:p>
+        </p:txBody>
+      </p:sp>
+      <p:sp>
+        <p:nvSpPr>
+          <p:cNvPr id="6" name="Title 1"/>
+          <p:cNvSpPr>
+            <a:spLocks noGrp="1"/>
+          </p:cNvSpPr>
+          <p:nvPr>
+            <p:ph type="title"/>
+          </p:nvPr>
+        </p:nvSpPr>
         <p:spPr>
-          <a:noFill/>
+          <a:xfrm>
+            <a:off x="2971800" y="319088"/>
+            <a:ext cx="4876800" cy="563562"/>
+          </a:xfrm>
         </p:spPr>
         <p:txBody>
           <a:bodyPr/>
           <a:lstStyle/>
           <a:p>
-            <a:fld id="{17E21074-7173-492D-B562-8E2E44D4A26C}" type="slidenum">
-              <a:rPr lang="en-US" smtClean="0"/>
-              <a:pPr/>
-              <a:t>29</a:t>
-            </a:fld>
-            <a:endParaRPr lang="en-US" dirty="0" smtClean="0"/>
+            <a:pPr algn="l" eaLnBrk="1" hangingPunct="1"/>
+            <a:r>
+              <a:rPr lang="en-US" dirty="0" smtClean="0"/>
+              <a:t>Embedded Hardware</a:t>
+            </a:r>
+          </a:p>
+        </p:txBody>
+      </p:sp>
+      <p:sp>
+        <p:nvSpPr>
+          <p:cNvPr id="7" name="Rounded Rectangle 6"/>
+          <p:cNvSpPr/>
+          <p:nvPr/>
+        </p:nvSpPr>
+        <p:spPr>
+          <a:xfrm>
+            <a:off x="304800" y="152400"/>
+            <a:ext cx="2667000" cy="838200"/>
+          </a:xfrm>
+          <a:prstGeom prst="roundRect">
+            <a:avLst/>
+          </a:prstGeom>
+          <a:solidFill>
+            <a:srgbClr val="7030A0"/>
+          </a:solidFill>
+        </p:spPr>
+        <p:style>
+          <a:lnRef idx="3">
+            <a:schemeClr val="lt1"/>
+          </a:lnRef>
+          <a:fillRef idx="1">
+            <a:schemeClr val="dk1"/>
+          </a:fillRef>
+          <a:effectRef idx="1">
+            <a:schemeClr val="dk1"/>
+          </a:effectRef>
+          <a:fontRef idx="minor">
+            <a:schemeClr val="lt1"/>
+          </a:fontRef>
+        </p:style>
+        <p:txBody>
+          <a:bodyPr rtlCol="0" anchor="ctr"/>
+          <a:lstStyle/>
+          <a:p>
+            <a:pPr algn="ctr"/>
+            <a:r>
+              <a:rPr lang="en-US" sz="4000" dirty="0" smtClean="0"/>
+              <a:t>Detail</a:t>
+            </a:r>
+            <a:endParaRPr lang="en-US" sz="4000" dirty="0"/>
           </a:p>
         </p:txBody>
       </p:sp>
       <p:pic>
         <p:nvPicPr>
-          <p:cNvPr id="6" name="Picture 5" descr="logo_final.png"/>
+          <p:cNvPr id="8" name="Picture 7" descr="logo_final.png"/>
           <p:cNvPicPr>
             <a:picLocks noChangeAspect="1"/>
           </p:cNvPicPr>
@@ -22239,8 +22230,8 @@
         </p:blipFill>
         <p:spPr>
           <a:xfrm>
-            <a:off x="4038600" y="5638800"/>
-            <a:ext cx="1447800" cy="1447800"/>
+            <a:off x="8001000" y="0"/>
+            <a:ext cx="1219200" cy="1219200"/>
           </a:xfrm>
           <a:prstGeom prst="rect">
             <a:avLst/>
@@ -22465,6 +22456,233 @@
           <a:xfrm>
             <a:off x="8001000" y="0"/>
             <a:ext cx="1219200" cy="1219200"/>
+          </a:xfrm>
+          <a:prstGeom prst="rect">
+            <a:avLst/>
+          </a:prstGeom>
+        </p:spPr>
+      </p:pic>
+    </p:spTree>
+  </p:cSld>
+  <p:clrMapOvr>
+    <a:masterClrMapping/>
+  </p:clrMapOvr>
+  <p:timing>
+    <p:tnLst>
+      <p:par>
+        <p:cTn id="1" dur="indefinite" restart="never" nodeType="tmRoot"/>
+      </p:par>
+    </p:tnLst>
+  </p:timing>
+</p:sld>
+</file>
+
+<file path=ppt/slides/slide30.xml><?xml version="1.0" encoding="utf-8"?>
+<p:sld xmlns:a="http://schemas.openxmlformats.org/drawingml/2006/main" xmlns:r="http://schemas.openxmlformats.org/officeDocument/2006/relationships" xmlns:p="http://schemas.openxmlformats.org/presentationml/2006/main">
+  <p:cSld>
+    <p:spTree>
+      <p:nvGrpSpPr>
+        <p:cNvPr id="1" name=""/>
+        <p:cNvGrpSpPr/>
+        <p:nvPr/>
+      </p:nvGrpSpPr>
+      <p:grpSpPr>
+        <a:xfrm>
+          <a:off x="0" y="0"/>
+          <a:ext cx="0" cy="0"/>
+          <a:chOff x="0" y="0"/>
+          <a:chExt cx="0" cy="0"/>
+        </a:xfrm>
+      </p:grpSpPr>
+      <p:sp>
+        <p:nvSpPr>
+          <p:cNvPr id="18434" name="Rectangle 2"/>
+          <p:cNvSpPr>
+            <a:spLocks noGrp="1" noChangeArrowheads="1"/>
+          </p:cNvSpPr>
+          <p:nvPr>
+            <p:ph type="subTitle" idx="1"/>
+          </p:nvPr>
+        </p:nvSpPr>
+        <p:spPr>
+          <a:xfrm>
+            <a:off x="1295400" y="3733800"/>
+            <a:ext cx="6400800" cy="685800"/>
+          </a:xfrm>
+        </p:spPr>
+        <p:txBody>
+          <a:bodyPr/>
+          <a:lstStyle/>
+          <a:p>
+            <a:pPr eaLnBrk="1" hangingPunct="1"/>
+            <a:r>
+              <a:rPr lang="en-US" dirty="0" smtClean="0"/>
+              <a:t>www.themegallery.com</a:t>
+            </a:r>
+          </a:p>
+        </p:txBody>
+      </p:sp>
+      <p:sp>
+        <p:nvSpPr>
+          <p:cNvPr id="18435" name="WordArt 3"/>
+          <p:cNvSpPr>
+            <a:spLocks noChangeArrowheads="1" noChangeShapeType="1" noTextEdit="1"/>
+          </p:cNvSpPr>
+          <p:nvPr/>
+        </p:nvSpPr>
+        <p:spPr bwMode="gray">
+          <a:xfrm>
+            <a:off x="2362200" y="4343400"/>
+            <a:ext cx="4724400" cy="609600"/>
+          </a:xfrm>
+          <a:prstGeom prst="rect">
+            <a:avLst/>
+          </a:prstGeom>
+        </p:spPr>
+        <p:txBody>
+          <a:bodyPr wrap="none" fromWordArt="1">
+            <a:prstTxWarp prst="textDeflate">
+              <a:avLst>
+                <a:gd name="adj" fmla="val 0"/>
+              </a:avLst>
+            </a:prstTxWarp>
+          </a:bodyPr>
+          <a:lstStyle/>
+          <a:p>
+            <a:pPr algn="ctr"/>
+            <a:r>
+              <a:rPr lang="en-US" sz="5400" b="1" kern="10" dirty="0">
+                <a:ln w="28575">
+                  <a:solidFill>
+                    <a:schemeClr val="bg1"/>
+                  </a:solidFill>
+                  <a:round/>
+                  <a:headEnd/>
+                  <a:tailEnd/>
+                </a:ln>
+                <a:gradFill rotWithShape="1">
+                  <a:gsLst>
+                    <a:gs pos="0">
+                      <a:schemeClr val="tx1"/>
+                    </a:gs>
+                    <a:gs pos="100000">
+                      <a:schemeClr val="accent2"/>
+                    </a:gs>
+                  </a:gsLst>
+                  <a:lin ang="5400000" scaled="1"/>
+                </a:gradFill>
+                <a:effectLst>
+                  <a:outerShdw dist="107763" dir="2700000" algn="ctr" rotWithShape="0">
+                    <a:srgbClr val="000000">
+                      <a:alpha val="50000"/>
+                    </a:srgbClr>
+                  </a:outerShdw>
+                </a:effectLst>
+                <a:latin typeface="Verdana"/>
+                <a:ea typeface="Verdana"/>
+                <a:cs typeface="Verdana"/>
+              </a:rPr>
+              <a:t>Thank You !</a:t>
+            </a:r>
+          </a:p>
+        </p:txBody>
+      </p:sp>
+      <p:sp>
+        <p:nvSpPr>
+          <p:cNvPr id="18436" name="Rectangle 4"/>
+          <p:cNvSpPr>
+            <a:spLocks noChangeArrowheads="1"/>
+          </p:cNvSpPr>
+          <p:nvPr/>
+        </p:nvSpPr>
+        <p:spPr bwMode="white">
+          <a:xfrm>
+            <a:off x="1524000" y="5181600"/>
+            <a:ext cx="7086600" cy="381000"/>
+          </a:xfrm>
+          <a:prstGeom prst="rect">
+            <a:avLst/>
+          </a:prstGeom>
+          <a:noFill/>
+          <a:ln w="9525">
+            <a:noFill/>
+            <a:miter lim="800000"/>
+            <a:headEnd/>
+            <a:tailEnd/>
+          </a:ln>
+        </p:spPr>
+        <p:txBody>
+          <a:bodyPr/>
+          <a:lstStyle/>
+          <a:p>
+            <a:pPr algn="ctr">
+              <a:lnSpc>
+                <a:spcPct val="90000"/>
+              </a:lnSpc>
+              <a:spcBef>
+                <a:spcPct val="20000"/>
+              </a:spcBef>
+              <a:buClr>
+                <a:schemeClr val="hlink"/>
+              </a:buClr>
+              <a:buFont typeface="Wingdings" pitchFamily="2" charset="2"/>
+              <a:buNone/>
+            </a:pPr>
+            <a:r>
+              <a:rPr lang="en-US" sz="2000" dirty="0">
+                <a:solidFill>
+                  <a:schemeClr val="bg1"/>
+                </a:solidFill>
+              </a:rPr>
+              <a:t>Confidential document</a:t>
+            </a:r>
+          </a:p>
+        </p:txBody>
+      </p:sp>
+      <p:sp>
+        <p:nvSpPr>
+          <p:cNvPr id="18437" name="Slide Number Placeholder 6"/>
+          <p:cNvSpPr>
+            <a:spLocks noGrp="1"/>
+          </p:cNvSpPr>
+          <p:nvPr>
+            <p:ph type="sldNum" sz="quarter" idx="12"/>
+          </p:nvPr>
+        </p:nvSpPr>
+        <p:spPr>
+          <a:noFill/>
+        </p:spPr>
+        <p:txBody>
+          <a:bodyPr/>
+          <a:lstStyle/>
+          <a:p>
+            <a:fld id="{17E21074-7173-492D-B562-8E2E44D4A26C}" type="slidenum">
+              <a:rPr lang="en-US" smtClean="0"/>
+              <a:pPr/>
+              <a:t>30</a:t>
+            </a:fld>
+            <a:endParaRPr lang="en-US" dirty="0" smtClean="0"/>
+          </a:p>
+        </p:txBody>
+      </p:sp>
+      <p:pic>
+        <p:nvPicPr>
+          <p:cNvPr id="6" name="Picture 5" descr="logo_final.png"/>
+          <p:cNvPicPr>
+            <a:picLocks noChangeAspect="1"/>
+          </p:cNvPicPr>
+          <p:nvPr/>
+        </p:nvPicPr>
+        <p:blipFill>
+          <a:blip r:embed="rId2" cstate="print"/>
+          <a:stretch>
+            <a:fillRect/>
+          </a:stretch>
+        </p:blipFill>
+        <p:spPr>
+          <a:xfrm>
+            <a:off x="4038600" y="5638800"/>
+            <a:ext cx="1447800" cy="1447800"/>
           </a:xfrm>
           <a:prstGeom prst="rect">
             <a:avLst/>
@@ -23314,13 +23532,7 @@
               <a:rPr lang="en-US" sz="3200" kern="0" dirty="0" smtClean="0">
                 <a:latin typeface="+mn-lt"/>
               </a:rPr>
-              <a:t> </a:t>
-            </a:r>
-            <a:r>
-              <a:rPr lang="en-US" sz="3200" kern="0" dirty="0" smtClean="0">
-                <a:latin typeface="+mn-lt"/>
-              </a:rPr>
-              <a:t>The modern solution should be </a:t>
+              <a:t> The modern solution should be </a:t>
             </a:r>
             <a:r>
               <a:rPr lang="en-US" sz="3200" b="1" kern="0" dirty="0" smtClean="0">

</xml_diff>